<commit_message>
Revision 2 of COSI paper
</commit_message>
<xml_diff>
--- a/talks/imaging_applied_optics_2016/images/figures_ppt.pptx
+++ b/talks/imaging_applied_optics_2016/images/figures_ppt.pptx
@@ -306,7 +306,7 @@
           <a:p>
             <a:fld id="{9D9501FF-ABFD-4A20-9D6D-E502A59752B5}" type="datetimeFigureOut">
               <a:rPr lang="en-US" smtClean="0"/>
-              <a:t>3/4/2016</a:t>
+              <a:t>3/6/2016</a:t>
             </a:fld>
             <a:endParaRPr lang="en-US"/>
           </a:p>
@@ -474,7 +474,7 @@
           <a:p>
             <a:fld id="{9D9501FF-ABFD-4A20-9D6D-E502A59752B5}" type="datetimeFigureOut">
               <a:rPr lang="en-US" smtClean="0"/>
-              <a:t>3/4/2016</a:t>
+              <a:t>3/6/2016</a:t>
             </a:fld>
             <a:endParaRPr lang="en-US"/>
           </a:p>
@@ -652,7 +652,7 @@
           <a:p>
             <a:fld id="{9D9501FF-ABFD-4A20-9D6D-E502A59752B5}" type="datetimeFigureOut">
               <a:rPr lang="en-US" smtClean="0"/>
-              <a:t>3/4/2016</a:t>
+              <a:t>3/6/2016</a:t>
             </a:fld>
             <a:endParaRPr lang="en-US"/>
           </a:p>
@@ -820,7 +820,7 @@
           <a:p>
             <a:fld id="{9D9501FF-ABFD-4A20-9D6D-E502A59752B5}" type="datetimeFigureOut">
               <a:rPr lang="en-US" smtClean="0"/>
-              <a:t>3/4/2016</a:t>
+              <a:t>3/6/2016</a:t>
             </a:fld>
             <a:endParaRPr lang="en-US"/>
           </a:p>
@@ -1065,7 +1065,7 @@
           <a:p>
             <a:fld id="{9D9501FF-ABFD-4A20-9D6D-E502A59752B5}" type="datetimeFigureOut">
               <a:rPr lang="en-US" smtClean="0"/>
-              <a:t>3/4/2016</a:t>
+              <a:t>3/6/2016</a:t>
             </a:fld>
             <a:endParaRPr lang="en-US"/>
           </a:p>
@@ -1294,7 +1294,7 @@
           <a:p>
             <a:fld id="{9D9501FF-ABFD-4A20-9D6D-E502A59752B5}" type="datetimeFigureOut">
               <a:rPr lang="en-US" smtClean="0"/>
-              <a:t>3/4/2016</a:t>
+              <a:t>3/6/2016</a:t>
             </a:fld>
             <a:endParaRPr lang="en-US"/>
           </a:p>
@@ -1658,7 +1658,7 @@
           <a:p>
             <a:fld id="{9D9501FF-ABFD-4A20-9D6D-E502A59752B5}" type="datetimeFigureOut">
               <a:rPr lang="en-US" smtClean="0"/>
-              <a:t>3/4/2016</a:t>
+              <a:t>3/6/2016</a:t>
             </a:fld>
             <a:endParaRPr lang="en-US"/>
           </a:p>
@@ -1775,7 +1775,7 @@
           <a:p>
             <a:fld id="{9D9501FF-ABFD-4A20-9D6D-E502A59752B5}" type="datetimeFigureOut">
               <a:rPr lang="en-US" smtClean="0"/>
-              <a:t>3/4/2016</a:t>
+              <a:t>3/6/2016</a:t>
             </a:fld>
             <a:endParaRPr lang="en-US"/>
           </a:p>
@@ -1870,7 +1870,7 @@
           <a:p>
             <a:fld id="{9D9501FF-ABFD-4A20-9D6D-E502A59752B5}" type="datetimeFigureOut">
               <a:rPr lang="en-US" smtClean="0"/>
-              <a:t>3/4/2016</a:t>
+              <a:t>3/6/2016</a:t>
             </a:fld>
             <a:endParaRPr lang="en-US"/>
           </a:p>
@@ -2145,7 +2145,7 @@
           <a:p>
             <a:fld id="{9D9501FF-ABFD-4A20-9D6D-E502A59752B5}" type="datetimeFigureOut">
               <a:rPr lang="en-US" smtClean="0"/>
-              <a:t>3/4/2016</a:t>
+              <a:t>3/6/2016</a:t>
             </a:fld>
             <a:endParaRPr lang="en-US"/>
           </a:p>
@@ -2400,7 +2400,7 @@
           <a:p>
             <a:fld id="{9D9501FF-ABFD-4A20-9D6D-E502A59752B5}" type="datetimeFigureOut">
               <a:rPr lang="en-US" smtClean="0"/>
-              <a:t>3/4/2016</a:t>
+              <a:t>3/6/2016</a:t>
             </a:fld>
             <a:endParaRPr lang="en-US"/>
           </a:p>
@@ -2611,7 +2611,7 @@
           <a:p>
             <a:fld id="{9D9501FF-ABFD-4A20-9D6D-E502A59752B5}" type="datetimeFigureOut">
               <a:rPr lang="en-US" smtClean="0"/>
-              <a:t>3/4/2016</a:t>
+              <a:t>3/6/2016</a:t>
             </a:fld>
             <a:endParaRPr lang="en-US"/>
           </a:p>
@@ -3706,7 +3706,277 @@
       </p:grpSpPr>
       <p:grpSp>
         <p:nvGrpSpPr>
-          <p:cNvPr id="81" name="Group 80"/>
+          <p:cNvPr id="7" name="Group 6" hidden="1"/>
+          <p:cNvGrpSpPr>
+            <a:grpSpLocks noChangeAspect="1"/>
+          </p:cNvGrpSpPr>
+          <p:nvPr/>
+        </p:nvGrpSpPr>
+        <p:grpSpPr>
+          <a:xfrm>
+            <a:off x="3276626" y="2046702"/>
+            <a:ext cx="363905" cy="453363"/>
+            <a:chOff x="6111782" y="3770504"/>
+            <a:chExt cx="511280" cy="636962"/>
+          </a:xfrm>
+          <a:scene3d>
+            <a:camera prst="orthographicFront"/>
+            <a:lightRig rig="threePt" dir="t"/>
+          </a:scene3d>
+        </p:grpSpPr>
+        <p:cxnSp>
+          <p:nvCxnSpPr>
+            <p:cNvPr id="52" name="Straight Arrow Connector 51"/>
+            <p:cNvCxnSpPr/>
+            <p:nvPr/>
+          </p:nvCxnSpPr>
+          <p:spPr>
+            <a:xfrm rot="19440000">
+              <a:off x="6277753" y="4096356"/>
+              <a:ext cx="274320" cy="0"/>
+            </a:xfrm>
+            <a:prstGeom prst="straightConnector1">
+              <a:avLst/>
+            </a:prstGeom>
+            <a:ln w="6350" cap="flat">
+              <a:solidFill>
+                <a:srgbClr val="DE0000">
+                  <a:alpha val="69804"/>
+                </a:srgbClr>
+              </a:solidFill>
+              <a:round/>
+              <a:headEnd w="sm" len="sm"/>
+              <a:tailEnd type="triangle" w="sm" len="med"/>
+            </a:ln>
+            <a:effectLst/>
+            <a:sp3d prstMaterial="matte">
+              <a:bevelT w="12700" h="12700"/>
+              <a:bevelB w="0" h="0"/>
+            </a:sp3d>
+          </p:spPr>
+          <p:style>
+            <a:lnRef idx="1">
+              <a:schemeClr val="accent1"/>
+            </a:lnRef>
+            <a:fillRef idx="0">
+              <a:schemeClr val="accent1"/>
+            </a:fillRef>
+            <a:effectRef idx="0">
+              <a:schemeClr val="accent1"/>
+            </a:effectRef>
+            <a:fontRef idx="minor">
+              <a:schemeClr val="tx1"/>
+            </a:fontRef>
+          </p:style>
+        </p:cxnSp>
+        <p:cxnSp>
+          <p:nvCxnSpPr>
+            <p:cNvPr id="53" name="Straight Arrow Connector 52"/>
+            <p:cNvCxnSpPr/>
+            <p:nvPr/>
+          </p:nvCxnSpPr>
+          <p:spPr>
+            <a:xfrm rot="16200000">
+              <a:off x="6165835" y="4047143"/>
+              <a:ext cx="274320" cy="0"/>
+            </a:xfrm>
+            <a:prstGeom prst="straightConnector1">
+              <a:avLst/>
+            </a:prstGeom>
+            <a:ln w="6350" cap="flat">
+              <a:solidFill>
+                <a:srgbClr val="00B050">
+                  <a:alpha val="70000"/>
+                </a:srgbClr>
+              </a:solidFill>
+              <a:round/>
+              <a:headEnd w="sm" len="sm"/>
+              <a:tailEnd type="triangle" w="sm" len="med"/>
+            </a:ln>
+            <a:effectLst/>
+            <a:sp3d prstMaterial="matte">
+              <a:bevelT w="12700" h="12700"/>
+              <a:bevelB w="0" h="0"/>
+            </a:sp3d>
+          </p:spPr>
+          <p:style>
+            <a:lnRef idx="1">
+              <a:schemeClr val="accent1"/>
+            </a:lnRef>
+            <a:fillRef idx="0">
+              <a:schemeClr val="accent1"/>
+            </a:fillRef>
+            <a:effectRef idx="0">
+              <a:schemeClr val="accent1"/>
+            </a:effectRef>
+            <a:fontRef idx="minor">
+              <a:schemeClr val="tx1"/>
+            </a:fontRef>
+          </p:style>
+        </p:cxnSp>
+        <p:cxnSp>
+          <p:nvCxnSpPr>
+            <p:cNvPr id="54" name="Straight Arrow Connector 53"/>
+            <p:cNvCxnSpPr/>
+            <p:nvPr/>
+          </p:nvCxnSpPr>
+          <p:spPr>
+            <a:xfrm>
+              <a:off x="6296805" y="4180493"/>
+              <a:ext cx="274320" cy="0"/>
+            </a:xfrm>
+            <a:prstGeom prst="straightConnector1">
+              <a:avLst/>
+            </a:prstGeom>
+            <a:ln w="6350" cap="flat">
+              <a:solidFill>
+                <a:srgbClr val="0078D2">
+                  <a:alpha val="70000"/>
+                </a:srgbClr>
+              </a:solidFill>
+              <a:round/>
+              <a:headEnd w="sm" len="sm"/>
+              <a:tailEnd type="triangle" w="sm" len="med"/>
+            </a:ln>
+            <a:effectLst/>
+            <a:sp3d prstMaterial="matte">
+              <a:bevelT w="12700" h="12700"/>
+              <a:bevelB w="0" h="0"/>
+            </a:sp3d>
+          </p:spPr>
+          <p:style>
+            <a:lnRef idx="1">
+              <a:schemeClr val="accent1"/>
+            </a:lnRef>
+            <a:fillRef idx="0">
+              <a:schemeClr val="accent1"/>
+            </a:fillRef>
+            <a:effectRef idx="0">
+              <a:schemeClr val="accent1"/>
+            </a:effectRef>
+            <a:fontRef idx="minor">
+              <a:schemeClr val="tx1"/>
+            </a:fontRef>
+          </p:style>
+        </p:cxnSp>
+        <p:sp>
+          <p:nvSpPr>
+            <p:cNvPr id="55" name="TextBox 54"/>
+            <p:cNvSpPr txBox="1"/>
+            <p:nvPr/>
+          </p:nvSpPr>
+          <p:spPr>
+            <a:xfrm>
+              <a:off x="6111782" y="3770504"/>
+              <a:ext cx="157163" cy="345935"/>
+            </a:xfrm>
+            <a:prstGeom prst="rect">
+              <a:avLst/>
+            </a:prstGeom>
+            <a:noFill/>
+          </p:spPr>
+          <p:txBody>
+            <a:bodyPr wrap="square" rtlCol="0">
+              <a:spAutoFit/>
+            </a:bodyPr>
+            <a:lstStyle/>
+            <a:p>
+              <a:r>
+                <a:rPr lang="en-US" sz="1000" i="1" dirty="0">
+                  <a:solidFill>
+                    <a:schemeClr val="tx1">
+                      <a:lumMod val="75000"/>
+                      <a:lumOff val="25000"/>
+                    </a:schemeClr>
+                  </a:solidFill>
+                  <a:latin typeface="Times New Roman" panose="02020603050405020304" pitchFamily="18" charset="0"/>
+                  <a:cs typeface="Times New Roman" panose="02020603050405020304" pitchFamily="18" charset="0"/>
+                </a:rPr>
+                <a:t>y</a:t>
+              </a:r>
+            </a:p>
+          </p:txBody>
+        </p:sp>
+        <p:sp>
+          <p:nvSpPr>
+            <p:cNvPr id="56" name="TextBox 55"/>
+            <p:cNvSpPr txBox="1"/>
+            <p:nvPr/>
+          </p:nvSpPr>
+          <p:spPr>
+            <a:xfrm>
+              <a:off x="6469250" y="3799875"/>
+              <a:ext cx="153812" cy="345935"/>
+            </a:xfrm>
+            <a:prstGeom prst="rect">
+              <a:avLst/>
+            </a:prstGeom>
+            <a:noFill/>
+          </p:spPr>
+          <p:txBody>
+            <a:bodyPr wrap="square" rtlCol="0">
+              <a:spAutoFit/>
+            </a:bodyPr>
+            <a:lstStyle/>
+            <a:p>
+              <a:r>
+                <a:rPr lang="en-US" sz="1000" i="1" dirty="0">
+                  <a:solidFill>
+                    <a:schemeClr val="tx1">
+                      <a:lumMod val="75000"/>
+                      <a:lumOff val="25000"/>
+                    </a:schemeClr>
+                  </a:solidFill>
+                  <a:latin typeface="Times New Roman" panose="02020603050405020304" pitchFamily="18" charset="0"/>
+                  <a:cs typeface="Times New Roman" panose="02020603050405020304" pitchFamily="18" charset="0"/>
+                </a:rPr>
+                <a:t>x</a:t>
+              </a:r>
+            </a:p>
+          </p:txBody>
+        </p:sp>
+        <p:sp>
+          <p:nvSpPr>
+            <p:cNvPr id="57" name="TextBox 56"/>
+            <p:cNvSpPr txBox="1"/>
+            <p:nvPr/>
+          </p:nvSpPr>
+          <p:spPr>
+            <a:xfrm>
+              <a:off x="6461375" y="4061529"/>
+              <a:ext cx="123823" cy="345937"/>
+            </a:xfrm>
+            <a:prstGeom prst="rect">
+              <a:avLst/>
+            </a:prstGeom>
+            <a:noFill/>
+          </p:spPr>
+          <p:txBody>
+            <a:bodyPr wrap="square" rtlCol="0">
+              <a:spAutoFit/>
+            </a:bodyPr>
+            <a:lstStyle/>
+            <a:p>
+              <a:r>
+                <a:rPr lang="en-US" sz="1000" i="1" dirty="0">
+                  <a:solidFill>
+                    <a:schemeClr val="tx1">
+                      <a:lumMod val="75000"/>
+                      <a:lumOff val="25000"/>
+                    </a:schemeClr>
+                  </a:solidFill>
+                  <a:latin typeface="Times New Roman" panose="02020603050405020304" pitchFamily="18" charset="0"/>
+                  <a:cs typeface="Times New Roman" panose="02020603050405020304" pitchFamily="18" charset="0"/>
+                </a:rPr>
+                <a:t>z</a:t>
+              </a:r>
+            </a:p>
+          </p:txBody>
+        </p:sp>
+      </p:grpSp>
+      <p:grpSp>
+        <p:nvGrpSpPr>
+          <p:cNvPr id="70" name="Group 69"/>
           <p:cNvGrpSpPr/>
           <p:nvPr/>
         </p:nvGrpSpPr>
@@ -4834,16 +5104,16 @@
         </p:grpSp>
         <p:grpSp>
           <p:nvGrpSpPr>
-            <p:cNvPr id="74" name="Group 73"/>
+            <p:cNvPr id="67" name="Group 66"/>
             <p:cNvGrpSpPr/>
             <p:nvPr/>
           </p:nvGrpSpPr>
           <p:grpSpPr>
             <a:xfrm>
               <a:off x="-49812" y="357188"/>
-              <a:ext cx="3914904" cy="2285000"/>
+              <a:ext cx="3997174" cy="2281342"/>
               <a:chOff x="-49812" y="357188"/>
-              <a:chExt cx="3914904" cy="2285000"/>
+              <a:chExt cx="3997174" cy="2281342"/>
             </a:xfrm>
           </p:grpSpPr>
           <p:sp>
@@ -5280,276 +5550,6 @@
               </p:spPr>
             </p:pic>
           </p:grpSp>
-          <p:grpSp>
-            <p:nvGrpSpPr>
-              <p:cNvPr id="7" name="Group 6"/>
-              <p:cNvGrpSpPr>
-                <a:grpSpLocks noChangeAspect="1"/>
-              </p:cNvGrpSpPr>
-              <p:nvPr/>
-            </p:nvGrpSpPr>
-            <p:grpSpPr>
-              <a:xfrm>
-                <a:off x="3366064" y="2188825"/>
-                <a:ext cx="363905" cy="453363"/>
-                <a:chOff x="6111782" y="3770504"/>
-                <a:chExt cx="511280" cy="636962"/>
-              </a:xfrm>
-              <a:scene3d>
-                <a:camera prst="orthographicFront"/>
-                <a:lightRig rig="threePt" dir="t"/>
-              </a:scene3d>
-            </p:grpSpPr>
-            <p:cxnSp>
-              <p:nvCxnSpPr>
-                <p:cNvPr id="52" name="Straight Arrow Connector 51"/>
-                <p:cNvCxnSpPr/>
-                <p:nvPr/>
-              </p:nvCxnSpPr>
-              <p:spPr>
-                <a:xfrm rot="19440000">
-                  <a:off x="6277753" y="4096356"/>
-                  <a:ext cx="274320" cy="0"/>
-                </a:xfrm>
-                <a:prstGeom prst="straightConnector1">
-                  <a:avLst/>
-                </a:prstGeom>
-                <a:ln w="6350" cap="flat">
-                  <a:solidFill>
-                    <a:srgbClr val="DE0000">
-                      <a:alpha val="69804"/>
-                    </a:srgbClr>
-                  </a:solidFill>
-                  <a:round/>
-                  <a:headEnd w="sm" len="sm"/>
-                  <a:tailEnd type="triangle" w="sm" len="med"/>
-                </a:ln>
-                <a:effectLst/>
-                <a:sp3d prstMaterial="matte">
-                  <a:bevelT w="12700" h="12700"/>
-                  <a:bevelB w="0" h="0"/>
-                </a:sp3d>
-              </p:spPr>
-              <p:style>
-                <a:lnRef idx="1">
-                  <a:schemeClr val="accent1"/>
-                </a:lnRef>
-                <a:fillRef idx="0">
-                  <a:schemeClr val="accent1"/>
-                </a:fillRef>
-                <a:effectRef idx="0">
-                  <a:schemeClr val="accent1"/>
-                </a:effectRef>
-                <a:fontRef idx="minor">
-                  <a:schemeClr val="tx1"/>
-                </a:fontRef>
-              </p:style>
-            </p:cxnSp>
-            <p:cxnSp>
-              <p:nvCxnSpPr>
-                <p:cNvPr id="53" name="Straight Arrow Connector 52"/>
-                <p:cNvCxnSpPr/>
-                <p:nvPr/>
-              </p:nvCxnSpPr>
-              <p:spPr>
-                <a:xfrm rot="16200000">
-                  <a:off x="6165835" y="4047143"/>
-                  <a:ext cx="274320" cy="0"/>
-                </a:xfrm>
-                <a:prstGeom prst="straightConnector1">
-                  <a:avLst/>
-                </a:prstGeom>
-                <a:ln w="6350" cap="flat">
-                  <a:solidFill>
-                    <a:srgbClr val="00B050">
-                      <a:alpha val="70000"/>
-                    </a:srgbClr>
-                  </a:solidFill>
-                  <a:round/>
-                  <a:headEnd w="sm" len="sm"/>
-                  <a:tailEnd type="triangle" w="sm" len="med"/>
-                </a:ln>
-                <a:effectLst/>
-                <a:sp3d prstMaterial="matte">
-                  <a:bevelT w="12700" h="12700"/>
-                  <a:bevelB w="0" h="0"/>
-                </a:sp3d>
-              </p:spPr>
-              <p:style>
-                <a:lnRef idx="1">
-                  <a:schemeClr val="accent1"/>
-                </a:lnRef>
-                <a:fillRef idx="0">
-                  <a:schemeClr val="accent1"/>
-                </a:fillRef>
-                <a:effectRef idx="0">
-                  <a:schemeClr val="accent1"/>
-                </a:effectRef>
-                <a:fontRef idx="minor">
-                  <a:schemeClr val="tx1"/>
-                </a:fontRef>
-              </p:style>
-            </p:cxnSp>
-            <p:cxnSp>
-              <p:nvCxnSpPr>
-                <p:cNvPr id="54" name="Straight Arrow Connector 53"/>
-                <p:cNvCxnSpPr/>
-                <p:nvPr/>
-              </p:nvCxnSpPr>
-              <p:spPr>
-                <a:xfrm>
-                  <a:off x="6296805" y="4180493"/>
-                  <a:ext cx="274320" cy="0"/>
-                </a:xfrm>
-                <a:prstGeom prst="straightConnector1">
-                  <a:avLst/>
-                </a:prstGeom>
-                <a:ln w="6350" cap="flat">
-                  <a:solidFill>
-                    <a:srgbClr val="0078D2">
-                      <a:alpha val="70000"/>
-                    </a:srgbClr>
-                  </a:solidFill>
-                  <a:round/>
-                  <a:headEnd w="sm" len="sm"/>
-                  <a:tailEnd type="triangle" w="sm" len="med"/>
-                </a:ln>
-                <a:effectLst/>
-                <a:sp3d prstMaterial="matte">
-                  <a:bevelT w="12700" h="12700"/>
-                  <a:bevelB w="0" h="0"/>
-                </a:sp3d>
-              </p:spPr>
-              <p:style>
-                <a:lnRef idx="1">
-                  <a:schemeClr val="accent1"/>
-                </a:lnRef>
-                <a:fillRef idx="0">
-                  <a:schemeClr val="accent1"/>
-                </a:fillRef>
-                <a:effectRef idx="0">
-                  <a:schemeClr val="accent1"/>
-                </a:effectRef>
-                <a:fontRef idx="minor">
-                  <a:schemeClr val="tx1"/>
-                </a:fontRef>
-              </p:style>
-            </p:cxnSp>
-            <p:sp>
-              <p:nvSpPr>
-                <p:cNvPr id="55" name="TextBox 54"/>
-                <p:cNvSpPr txBox="1"/>
-                <p:nvPr/>
-              </p:nvSpPr>
-              <p:spPr>
-                <a:xfrm>
-                  <a:off x="6111782" y="3770504"/>
-                  <a:ext cx="157163" cy="345935"/>
-                </a:xfrm>
-                <a:prstGeom prst="rect">
-                  <a:avLst/>
-                </a:prstGeom>
-                <a:noFill/>
-              </p:spPr>
-              <p:txBody>
-                <a:bodyPr wrap="square" rtlCol="0">
-                  <a:spAutoFit/>
-                </a:bodyPr>
-                <a:lstStyle/>
-                <a:p>
-                  <a:r>
-                    <a:rPr lang="en-US" sz="1000" i="1" dirty="0">
-                      <a:solidFill>
-                        <a:schemeClr val="tx1">
-                          <a:lumMod val="75000"/>
-                          <a:lumOff val="25000"/>
-                        </a:schemeClr>
-                      </a:solidFill>
-                      <a:latin typeface="Times New Roman" panose="02020603050405020304" pitchFamily="18" charset="0"/>
-                      <a:cs typeface="Times New Roman" panose="02020603050405020304" pitchFamily="18" charset="0"/>
-                    </a:rPr>
-                    <a:t>y</a:t>
-                  </a:r>
-                </a:p>
-              </p:txBody>
-            </p:sp>
-            <p:sp>
-              <p:nvSpPr>
-                <p:cNvPr id="56" name="TextBox 55"/>
-                <p:cNvSpPr txBox="1"/>
-                <p:nvPr/>
-              </p:nvSpPr>
-              <p:spPr>
-                <a:xfrm>
-                  <a:off x="6469250" y="3799875"/>
-                  <a:ext cx="153812" cy="345935"/>
-                </a:xfrm>
-                <a:prstGeom prst="rect">
-                  <a:avLst/>
-                </a:prstGeom>
-                <a:noFill/>
-              </p:spPr>
-              <p:txBody>
-                <a:bodyPr wrap="square" rtlCol="0">
-                  <a:spAutoFit/>
-                </a:bodyPr>
-                <a:lstStyle/>
-                <a:p>
-                  <a:r>
-                    <a:rPr lang="en-US" sz="1000" i="1" dirty="0">
-                      <a:solidFill>
-                        <a:schemeClr val="tx1">
-                          <a:lumMod val="75000"/>
-                          <a:lumOff val="25000"/>
-                        </a:schemeClr>
-                      </a:solidFill>
-                      <a:latin typeface="Times New Roman" panose="02020603050405020304" pitchFamily="18" charset="0"/>
-                      <a:cs typeface="Times New Roman" panose="02020603050405020304" pitchFamily="18" charset="0"/>
-                    </a:rPr>
-                    <a:t>x</a:t>
-                  </a:r>
-                </a:p>
-              </p:txBody>
-            </p:sp>
-            <p:sp>
-              <p:nvSpPr>
-                <p:cNvPr id="57" name="TextBox 56"/>
-                <p:cNvSpPr txBox="1"/>
-                <p:nvPr/>
-              </p:nvSpPr>
-              <p:spPr>
-                <a:xfrm>
-                  <a:off x="6461375" y="4061529"/>
-                  <a:ext cx="123823" cy="345937"/>
-                </a:xfrm>
-                <a:prstGeom prst="rect">
-                  <a:avLst/>
-                </a:prstGeom>
-                <a:noFill/>
-              </p:spPr>
-              <p:txBody>
-                <a:bodyPr wrap="square" rtlCol="0">
-                  <a:spAutoFit/>
-                </a:bodyPr>
-                <a:lstStyle/>
-                <a:p>
-                  <a:r>
-                    <a:rPr lang="en-US" sz="1000" i="1" dirty="0">
-                      <a:solidFill>
-                        <a:schemeClr val="tx1">
-                          <a:lumMod val="75000"/>
-                          <a:lumOff val="25000"/>
-                        </a:schemeClr>
-                      </a:solidFill>
-                      <a:latin typeface="Times New Roman" panose="02020603050405020304" pitchFamily="18" charset="0"/>
-                      <a:cs typeface="Times New Roman" panose="02020603050405020304" pitchFamily="18" charset="0"/>
-                    </a:rPr>
-                    <a:t>z</a:t>
-                  </a:r>
-                </a:p>
-              </p:txBody>
-            </p:sp>
-          </p:grpSp>
           <p:cxnSp>
             <p:nvCxnSpPr>
               <p:cNvPr id="8" name="Straight Connector 7"/>
@@ -5978,82 +5978,178 @@
               </a:p>
             </p:txBody>
           </p:sp>
-          <p:sp>
-            <p:nvSpPr>
-              <p:cNvPr id="18" name="TextBox 17"/>
-              <p:cNvSpPr txBox="1"/>
-              <p:nvPr/>
-            </p:nvSpPr>
-            <p:spPr>
-              <a:xfrm>
-                <a:off x="2317055" y="438925"/>
-                <a:ext cx="1419021" cy="800219"/>
-              </a:xfrm>
-              <a:prstGeom prst="rect">
-                <a:avLst/>
-              </a:prstGeom>
-              <a:noFill/>
-            </p:spPr>
-            <p:txBody>
-              <a:bodyPr wrap="square" rtlCol="0">
-                <a:spAutoFit/>
-              </a:bodyPr>
-              <a:lstStyle/>
-              <a:p>
-                <a:pPr algn="ctr"/>
-                <a:r>
-                  <a:rPr lang="en-US" sz="900" i="1" dirty="0">
-                    <a:solidFill>
-                      <a:schemeClr val="tx1">
-                        <a:lumMod val="65000"/>
-                        <a:lumOff val="35000"/>
-                      </a:schemeClr>
-                    </a:solidFill>
-                  </a:rPr>
-                  <a:t>LENS </a:t>
-                </a:r>
-              </a:p>
-              <a:p>
-                <a:pPr algn="ctr"/>
-                <a:r>
-                  <a:rPr lang="en-US" sz="900" i="1" dirty="0">
-                    <a:solidFill>
-                      <a:schemeClr val="tx1">
-                        <a:lumMod val="65000"/>
-                        <a:lumOff val="35000"/>
-                      </a:schemeClr>
-                    </a:solidFill>
-                  </a:rPr>
-                  <a:t>Paraxial thick-lens model with spherical aberration;</a:t>
-                </a:r>
-              </a:p>
-              <a:p>
-                <a:pPr algn="ctr"/>
-                <a:r>
-                  <a:rPr lang="en-US" sz="900" dirty="0">
-                    <a:solidFill>
-                      <a:schemeClr val="tx1">
-                        <a:lumMod val="75000"/>
-                        <a:lumOff val="25000"/>
-                      </a:schemeClr>
-                    </a:solidFill>
-                  </a:rPr>
-                  <a:t>f = 24 mm, F/2.5</a:t>
-                </a:r>
-              </a:p>
-              <a:p>
-                <a:pPr algn="ctr"/>
-                <a:endParaRPr lang="en-US" sz="1000" i="1" dirty="0">
-                  <a:solidFill>
-                    <a:schemeClr val="tx1">
-                      <a:lumMod val="65000"/>
-                      <a:lumOff val="35000"/>
-                    </a:schemeClr>
-                  </a:solidFill>
-                </a:endParaRPr>
-              </a:p>
-            </p:txBody>
-          </p:sp>
+          <mc:AlternateContent xmlns:mc="http://schemas.openxmlformats.org/markup-compatibility/2006">
+            <mc:Choice xmlns:a14="http://schemas.microsoft.com/office/drawing/2010/main" Requires="a14">
+              <p:sp>
+                <p:nvSpPr>
+                  <p:cNvPr id="18" name="TextBox 17"/>
+                  <p:cNvSpPr txBox="1"/>
+                  <p:nvPr/>
+                </p:nvSpPr>
+                <p:spPr>
+                  <a:xfrm>
+                    <a:off x="2317055" y="438925"/>
+                    <a:ext cx="1419021" cy="800219"/>
+                  </a:xfrm>
+                  <a:prstGeom prst="rect">
+                    <a:avLst/>
+                  </a:prstGeom>
+                  <a:noFill/>
+                </p:spPr>
+                <p:txBody>
+                  <a:bodyPr wrap="square" rtlCol="0">
+                    <a:spAutoFit/>
+                  </a:bodyPr>
+                  <a:lstStyle/>
+                  <a:p>
+                    <a:pPr algn="ctr"/>
+                    <a:r>
+                      <a:rPr lang="en-US" sz="900" i="1" dirty="0">
+                        <a:solidFill>
+                          <a:schemeClr val="tx1">
+                            <a:lumMod val="65000"/>
+                            <a:lumOff val="35000"/>
+                          </a:schemeClr>
+                        </a:solidFill>
+                      </a:rPr>
+                      <a:t>LENS </a:t>
+                    </a:r>
+                  </a:p>
+                  <a:p>
+                    <a:pPr algn="ctr"/>
+                    <a:r>
+                      <a:rPr lang="en-US" sz="900" i="1" dirty="0">
+                        <a:solidFill>
+                          <a:schemeClr val="tx1">
+                            <a:lumMod val="65000"/>
+                            <a:lumOff val="35000"/>
+                          </a:schemeClr>
+                        </a:solidFill>
+                      </a:rPr>
+                      <a:t>Paraxial thick-lens model with spherical aberration;</a:t>
+                    </a:r>
+                  </a:p>
+                  <a:p>
+                    <a:pPr algn="ctr"/>
+                    <a14:m>
+                      <m:oMath xmlns:m="http://schemas.openxmlformats.org/officeDocument/2006/math">
+                        <m:r>
+                          <a:rPr lang="en-US" sz="900" i="1" dirty="0" smtClean="0">
+                            <a:solidFill>
+                              <a:schemeClr val="tx1">
+                                <a:lumMod val="75000"/>
+                                <a:lumOff val="25000"/>
+                              </a:schemeClr>
+                            </a:solidFill>
+                            <a:latin typeface="Cambria Math" panose="02040503050406030204" pitchFamily="18" charset="0"/>
+                          </a:rPr>
+                          <m:t>𝑓</m:t>
+                        </m:r>
+                      </m:oMath>
+                    </a14:m>
+                    <a:r>
+                      <a:rPr lang="en-US" sz="900" dirty="0">
+                        <a:solidFill>
+                          <a:schemeClr val="tx1">
+                            <a:lumMod val="75000"/>
+                            <a:lumOff val="25000"/>
+                          </a:schemeClr>
+                        </a:solidFill>
+                      </a:rPr>
+                      <a:t> = 24 mm, F/2.5, </a:t>
+                    </a:r>
+                    <a14:m>
+                      <m:oMath xmlns:m="http://schemas.openxmlformats.org/officeDocument/2006/math">
+                        <m:r>
+                          <a:rPr lang="en-US" sz="900" i="1" dirty="0" smtClean="0">
+                            <a:solidFill>
+                              <a:schemeClr val="tx1">
+                                <a:lumMod val="75000"/>
+                                <a:lumOff val="25000"/>
+                              </a:schemeClr>
+                            </a:solidFill>
+                            <a:latin typeface="Cambria Math" panose="02040503050406030204" pitchFamily="18" charset="0"/>
+                          </a:rPr>
+                          <m:t>𝑑</m:t>
+                        </m:r>
+                      </m:oMath>
+                    </a14:m>
+                    <a:r>
+                      <a:rPr lang="en-US" sz="900" baseline="30000" dirty="0">
+                        <a:solidFill>
+                          <a:schemeClr val="tx1">
+                            <a:lumMod val="75000"/>
+                            <a:lumOff val="25000"/>
+                          </a:schemeClr>
+                        </a:solidFill>
+                      </a:rPr>
+                      <a:t>*</a:t>
+                    </a:r>
+                    <a:r>
+                      <a:rPr lang="en-US" sz="900" dirty="0">
+                        <a:solidFill>
+                          <a:schemeClr val="tx1">
+                            <a:lumMod val="75000"/>
+                            <a:lumOff val="25000"/>
+                          </a:schemeClr>
+                        </a:solidFill>
+                      </a:rPr>
+                      <a:t> = 8</a:t>
+                    </a:r>
+                  </a:p>
+                  <a:p>
+                    <a:pPr algn="ctr"/>
+                    <a:endParaRPr lang="en-US" sz="1000" i="1" dirty="0">
+                      <a:solidFill>
+                        <a:schemeClr val="tx1">
+                          <a:lumMod val="65000"/>
+                          <a:lumOff val="35000"/>
+                        </a:schemeClr>
+                      </a:solidFill>
+                    </a:endParaRPr>
+                  </a:p>
+                </p:txBody>
+              </p:sp>
+            </mc:Choice>
+            <mc:Fallback>
+              <p:sp>
+                <p:nvSpPr>
+                  <p:cNvPr id="18" name="TextBox 17"/>
+                  <p:cNvSpPr txBox="1">
+                    <a:spLocks noRot="1" noChangeAspect="1" noMove="1" noResize="1" noEditPoints="1" noAdjustHandles="1" noChangeArrowheads="1" noChangeShapeType="1" noTextEdit="1"/>
+                  </p:cNvSpPr>
+                  <p:nvPr/>
+                </p:nvSpPr>
+                <p:spPr>
+                  <a:xfrm>
+                    <a:off x="2317055" y="438925"/>
+                    <a:ext cx="1419021" cy="800219"/>
+                  </a:xfrm>
+                  <a:prstGeom prst="rect">
+                    <a:avLst/>
+                  </a:prstGeom>
+                  <a:blipFill>
+                    <a:blip r:embed="rId10"/>
+                    <a:stretch>
+                      <a:fillRect/>
+                    </a:stretch>
+                  </a:blipFill>
+                </p:spPr>
+                <p:txBody>
+                  <a:bodyPr/>
+                  <a:lstStyle/>
+                  <a:p>
+                    <a:r>
+                      <a:rPr lang="en-US">
+                        <a:noFill/>
+                      </a:rPr>
+                      <a:t> </a:t>
+                    </a:r>
+                  </a:p>
+                </p:txBody>
+              </p:sp>
+            </mc:Fallback>
+          </mc:AlternateContent>
           <p:cxnSp>
             <p:nvCxnSpPr>
               <p:cNvPr id="19" name="Straight Connector 18"/>
@@ -6117,7 +6213,7 @@
             </p:grpSpPr>
             <mc:AlternateContent xmlns:mc="http://schemas.openxmlformats.org/markup-compatibility/2006" xmlns:p14="http://schemas.microsoft.com/office/powerpoint/2010/main">
               <mc:Choice Requires="p14">
-                <p:contentPart p14:bwMode="auto" r:id="rId10">
+                <p:contentPart p14:bwMode="auto" r:id="rId11">
                   <p14:nvContentPartPr>
                     <p14:cNvPr id="50" name="Ink 49"/>
                     <p14:cNvContentPartPr/>
@@ -6137,7 +6233,7 @@
                     <p:nvPr/>
                   </p:nvPicPr>
                   <p:blipFill>
-                    <a:blip r:embed="rId11"/>
+                    <a:blip r:embed="rId12"/>
                     <a:stretch>
                       <a:fillRect/>
                     </a:stretch>
@@ -6156,7 +6252,7 @@
             </mc:AlternateContent>
             <mc:AlternateContent xmlns:mc="http://schemas.openxmlformats.org/markup-compatibility/2006" xmlns:p14="http://schemas.microsoft.com/office/powerpoint/2010/main">
               <mc:Choice Requires="p14">
-                <p:contentPart p14:bwMode="auto" r:id="rId12">
+                <p:contentPart p14:bwMode="auto" r:id="rId13">
                   <p14:nvContentPartPr>
                     <p14:cNvPr id="51" name="Ink 50"/>
                     <p14:cNvContentPartPr/>
@@ -6176,7 +6272,7 @@
                     <p:nvPr/>
                   </p:nvPicPr>
                   <p:blipFill>
-                    <a:blip r:embed="rId13"/>
+                    <a:blip r:embed="rId14"/>
                     <a:stretch>
                       <a:fillRect/>
                     </a:stretch>
@@ -7745,7 +7841,7 @@
                     <a:avLst/>
                   </a:prstGeom>
                   <a:blipFill>
-                    <a:blip r:embed="rId14"/>
+                    <a:blip r:embed="rId15"/>
                     <a:stretch>
                       <a:fillRect b="-13158"/>
                     </a:stretch>
@@ -7930,9 +8026,109 @@
                     <a:avLst/>
                   </a:prstGeom>
                   <a:blipFill>
-                    <a:blip r:embed="rId15"/>
+                    <a:blip r:embed="rId16"/>
                     <a:stretch>
                       <a:fillRect r="-13158"/>
+                    </a:stretch>
+                  </a:blipFill>
+                </p:spPr>
+                <p:txBody>
+                  <a:bodyPr/>
+                  <a:lstStyle/>
+                  <a:p>
+                    <a:r>
+                      <a:rPr lang="en-US">
+                        <a:noFill/>
+                      </a:rPr>
+                      <a:t> </a:t>
+                    </a:r>
+                  </a:p>
+                </p:txBody>
+              </p:sp>
+            </mc:Fallback>
+          </mc:AlternateContent>
+          <mc:AlternateContent xmlns:mc="http://schemas.openxmlformats.org/markup-compatibility/2006">
+            <mc:Choice xmlns:a14="http://schemas.microsoft.com/office/drawing/2010/main" Requires="a14">
+              <p:sp>
+                <p:nvSpPr>
+                  <p:cNvPr id="26" name="TextBox 25"/>
+                  <p:cNvSpPr txBox="1"/>
+                  <p:nvPr/>
+                </p:nvSpPr>
+                <p:spPr>
+                  <a:xfrm>
+                    <a:off x="2036261" y="2407698"/>
+                    <a:ext cx="1911101" cy="230832"/>
+                  </a:xfrm>
+                  <a:prstGeom prst="rect">
+                    <a:avLst/>
+                  </a:prstGeom>
+                  <a:noFill/>
+                </p:spPr>
+                <p:txBody>
+                  <a:bodyPr wrap="none" rtlCol="0">
+                    <a:spAutoFit/>
+                  </a:bodyPr>
+                  <a:lstStyle/>
+                  <a:p>
+                    <a:r>
+                      <a:rPr lang="en-US" sz="1200" baseline="12000" dirty="0"/>
+                      <a:t>*</a:t>
+                    </a:r>
+                    <a:r>
+                      <a:rPr lang="en-US" sz="900" dirty="0"/>
+                      <a:t> </a:t>
+                    </a:r>
+                    <a14:m>
+                      <m:oMath xmlns:m="http://schemas.openxmlformats.org/officeDocument/2006/math">
+                        <m:r>
+                          <a:rPr lang="en-US" sz="800" i="1" dirty="0" smtClean="0">
+                            <a:latin typeface="Cambria Math" panose="02040503050406030204" pitchFamily="18" charset="0"/>
+                          </a:rPr>
+                          <m:t>𝑑</m:t>
+                        </m:r>
+                      </m:oMath>
+                    </a14:m>
+                    <a:r>
+                      <a:rPr lang="en-US" sz="800" dirty="0"/>
+                      <a:t> </a:t>
+                    </a:r>
+                    <a:r>
+                      <a:rPr lang="en-US" sz="800" i="1" dirty="0">
+                        <a:latin typeface="Times New Roman" panose="02020603050405020304" pitchFamily="18" charset="0"/>
+                        <a:cs typeface="Times New Roman" panose="02020603050405020304" pitchFamily="18" charset="0"/>
+                      </a:rPr>
+                      <a:t>is the separation between the pupils. </a:t>
+                    </a:r>
+                    <a:endParaRPr lang="en-US" sz="900" i="1" dirty="0">
+                      <a:latin typeface="Times New Roman" panose="02020603050405020304" pitchFamily="18" charset="0"/>
+                      <a:cs typeface="Times New Roman" panose="02020603050405020304" pitchFamily="18" charset="0"/>
+                    </a:endParaRPr>
+                  </a:p>
+                </p:txBody>
+              </p:sp>
+            </mc:Choice>
+            <mc:Fallback>
+              <p:sp>
+                <p:nvSpPr>
+                  <p:cNvPr id="26" name="TextBox 25"/>
+                  <p:cNvSpPr txBox="1">
+                    <a:spLocks noRot="1" noChangeAspect="1" noMove="1" noResize="1" noEditPoints="1" noAdjustHandles="1" noChangeArrowheads="1" noChangeShapeType="1" noTextEdit="1"/>
+                  </p:cNvSpPr>
+                  <p:nvPr/>
+                </p:nvSpPr>
+                <p:spPr>
+                  <a:xfrm>
+                    <a:off x="2036261" y="2407698"/>
+                    <a:ext cx="1911101" cy="230832"/>
+                  </a:xfrm>
+                  <a:prstGeom prst="rect">
+                    <a:avLst/>
+                  </a:prstGeom>
+                  <a:blipFill>
+                    <a:blip r:embed="rId17"/>
+                    <a:stretch>
+                      <a:fillRect b="-5263"/>
                     </a:stretch>
                   </a:blipFill>
                 </p:spPr>

</xml_diff>

<commit_message>
updated with latest figures
</commit_message>
<xml_diff>
--- a/talks/imaging_applied_optics_2016/images/figures_ppt.pptx
+++ b/talks/imaging_applied_optics_2016/images/figures_ppt.pptx
@@ -1,6 +1,6 @@
 
 <file path=ppt/presentation.xml><?xml version="1.0" encoding="utf-8"?>
-<p:presentation xmlns:a="http://schemas.openxmlformats.org/drawingml/2006/main" xmlns:r="http://schemas.openxmlformats.org/officeDocument/2006/relationships" xmlns:p="http://schemas.openxmlformats.org/presentationml/2006/main" saveSubsetFonts="1">
+<p:presentation xmlns:a="http://schemas.openxmlformats.org/drawingml/2006/main" xmlns:r="http://schemas.openxmlformats.org/officeDocument/2006/relationships" xmlns:p="http://schemas.openxmlformats.org/presentationml/2006/main" saveSubsetFonts="1" autoCompressPictures="0">
   <p:sldMasterIdLst>
     <p:sldMasterId id="2147483648" r:id="rId1"/>
   </p:sldMasterIdLst>
@@ -308,7 +308,7 @@
           <a:p>
             <a:fld id="{9D9501FF-ABFD-4A20-9D6D-E502A59752B5}" type="datetimeFigureOut">
               <a:rPr lang="en-US" smtClean="0"/>
-              <a:t>3/7/2016</a:t>
+              <a:t>3/16/2016</a:t>
             </a:fld>
             <a:endParaRPr lang="en-US"/>
           </a:p>
@@ -476,7 +476,7 @@
           <a:p>
             <a:fld id="{9D9501FF-ABFD-4A20-9D6D-E502A59752B5}" type="datetimeFigureOut">
               <a:rPr lang="en-US" smtClean="0"/>
-              <a:t>3/7/2016</a:t>
+              <a:t>3/16/2016</a:t>
             </a:fld>
             <a:endParaRPr lang="en-US"/>
           </a:p>
@@ -654,7 +654,7 @@
           <a:p>
             <a:fld id="{9D9501FF-ABFD-4A20-9D6D-E502A59752B5}" type="datetimeFigureOut">
               <a:rPr lang="en-US" smtClean="0"/>
-              <a:t>3/7/2016</a:t>
+              <a:t>3/16/2016</a:t>
             </a:fld>
             <a:endParaRPr lang="en-US"/>
           </a:p>
@@ -822,7 +822,7 @@
           <a:p>
             <a:fld id="{9D9501FF-ABFD-4A20-9D6D-E502A59752B5}" type="datetimeFigureOut">
               <a:rPr lang="en-US" smtClean="0"/>
-              <a:t>3/7/2016</a:t>
+              <a:t>3/16/2016</a:t>
             </a:fld>
             <a:endParaRPr lang="en-US"/>
           </a:p>
@@ -1067,7 +1067,7 @@
           <a:p>
             <a:fld id="{9D9501FF-ABFD-4A20-9D6D-E502A59752B5}" type="datetimeFigureOut">
               <a:rPr lang="en-US" smtClean="0"/>
-              <a:t>3/7/2016</a:t>
+              <a:t>3/16/2016</a:t>
             </a:fld>
             <a:endParaRPr lang="en-US"/>
           </a:p>
@@ -1296,7 +1296,7 @@
           <a:p>
             <a:fld id="{9D9501FF-ABFD-4A20-9D6D-E502A59752B5}" type="datetimeFigureOut">
               <a:rPr lang="en-US" smtClean="0"/>
-              <a:t>3/7/2016</a:t>
+              <a:t>3/16/2016</a:t>
             </a:fld>
             <a:endParaRPr lang="en-US"/>
           </a:p>
@@ -1660,7 +1660,7 @@
           <a:p>
             <a:fld id="{9D9501FF-ABFD-4A20-9D6D-E502A59752B5}" type="datetimeFigureOut">
               <a:rPr lang="en-US" smtClean="0"/>
-              <a:t>3/7/2016</a:t>
+              <a:t>3/16/2016</a:t>
             </a:fld>
             <a:endParaRPr lang="en-US"/>
           </a:p>
@@ -1777,7 +1777,7 @@
           <a:p>
             <a:fld id="{9D9501FF-ABFD-4A20-9D6D-E502A59752B5}" type="datetimeFigureOut">
               <a:rPr lang="en-US" smtClean="0"/>
-              <a:t>3/7/2016</a:t>
+              <a:t>3/16/2016</a:t>
             </a:fld>
             <a:endParaRPr lang="en-US"/>
           </a:p>
@@ -1872,7 +1872,7 @@
           <a:p>
             <a:fld id="{9D9501FF-ABFD-4A20-9D6D-E502A59752B5}" type="datetimeFigureOut">
               <a:rPr lang="en-US" smtClean="0"/>
-              <a:t>3/7/2016</a:t>
+              <a:t>3/16/2016</a:t>
             </a:fld>
             <a:endParaRPr lang="en-US"/>
           </a:p>
@@ -2147,7 +2147,7 @@
           <a:p>
             <a:fld id="{9D9501FF-ABFD-4A20-9D6D-E502A59752B5}" type="datetimeFigureOut">
               <a:rPr lang="en-US" smtClean="0"/>
-              <a:t>3/7/2016</a:t>
+              <a:t>3/16/2016</a:t>
             </a:fld>
             <a:endParaRPr lang="en-US"/>
           </a:p>
@@ -2402,7 +2402,7 @@
           <a:p>
             <a:fld id="{9D9501FF-ABFD-4A20-9D6D-E502A59752B5}" type="datetimeFigureOut">
               <a:rPr lang="en-US" smtClean="0"/>
-              <a:t>3/7/2016</a:t>
+              <a:t>3/16/2016</a:t>
             </a:fld>
             <a:endParaRPr lang="en-US"/>
           </a:p>
@@ -2613,7 +2613,7 @@
           <a:p>
             <a:fld id="{9D9501FF-ABFD-4A20-9D6D-E502A59752B5}" type="datetimeFigureOut">
               <a:rPr lang="en-US" smtClean="0"/>
-              <a:t>3/7/2016</a:t>
+              <a:t>3/16/2016</a:t>
             </a:fld>
             <a:endParaRPr lang="en-US"/>
           </a:p>

</xml_diff>

<commit_message>
Material finally submitted to COSI
</commit_message>
<xml_diff>
--- a/talks/imaging_applied_optics_2016/images/figures_ppt.pptx
+++ b/talks/imaging_applied_optics_2016/images/figures_ppt.pptx
@@ -9838,21 +9838,21 @@
       </p:grpSpPr>
       <p:grpSp>
         <p:nvGrpSpPr>
-          <p:cNvPr id="624" name="Group 623"/>
+          <p:cNvPr id="4" name="Group 3"/>
           <p:cNvGrpSpPr/>
           <p:nvPr/>
         </p:nvGrpSpPr>
         <p:grpSpPr>
           <a:xfrm>
-            <a:off x="91157" y="3237028"/>
-            <a:ext cx="5176167" cy="1721377"/>
-            <a:chOff x="91157" y="3237028"/>
-            <a:chExt cx="5176167" cy="1721377"/>
+            <a:off x="95836" y="3239333"/>
+            <a:ext cx="5171488" cy="1719072"/>
+            <a:chOff x="95836" y="3239333"/>
+            <a:chExt cx="5171488" cy="1719072"/>
           </a:xfrm>
         </p:grpSpPr>
         <p:pic>
           <p:nvPicPr>
-            <p:cNvPr id="612" name="Picture 611"/>
+            <p:cNvPr id="2" name="Picture 1"/>
             <p:cNvPicPr>
               <a:picLocks noChangeAspect="1"/>
             </p:cNvPicPr>
@@ -9866,8 +9866,8 @@
           </p:blipFill>
           <p:spPr>
             <a:xfrm>
-              <a:off x="91157" y="3237028"/>
-              <a:ext cx="3495015" cy="1721377"/>
+              <a:off x="95836" y="3239333"/>
+              <a:ext cx="3490336" cy="1719072"/>
             </a:xfrm>
             <a:prstGeom prst="rect">
               <a:avLst/>
@@ -9876,7 +9876,7 @@
         </p:pic>
         <p:grpSp>
           <p:nvGrpSpPr>
-            <p:cNvPr id="621" name="Group 620"/>
+            <p:cNvPr id="3" name="Group 2"/>
             <p:cNvGrpSpPr/>
             <p:nvPr/>
           </p:nvGrpSpPr>
@@ -9884,814 +9884,10 @@
             <a:xfrm>
               <a:off x="3604648" y="3424100"/>
               <a:ext cx="1662676" cy="1325297"/>
-              <a:chOff x="3842772" y="3452673"/>
+              <a:chOff x="3604648" y="3424100"/>
               <a:chExt cx="1662676" cy="1325297"/>
             </a:xfrm>
           </p:grpSpPr>
-          <mc:AlternateContent xmlns:mc="http://schemas.openxmlformats.org/markup-compatibility/2006">
-            <mc:Choice xmlns:a14="http://schemas.microsoft.com/office/drawing/2010/main" Requires="a14">
-              <p:sp>
-                <p:nvSpPr>
-                  <p:cNvPr id="614" name="Text Box 15"/>
-                  <p:cNvSpPr txBox="1">
-                    <a:spLocks noChangeAspect="1"/>
-                  </p:cNvSpPr>
-                  <p:nvPr/>
-                </p:nvSpPr>
-                <p:spPr>
-                  <a:xfrm flipH="1">
-                    <a:off x="3842772" y="3452673"/>
-                    <a:ext cx="1550934" cy="326409"/>
-                  </a:xfrm>
-                  <a:prstGeom prst="rect">
-                    <a:avLst/>
-                  </a:prstGeom>
-                  <a:noFill/>
-                  <a:ln w="6350">
-                    <a:noFill/>
-                  </a:ln>
-                  <a:effectLst/>
-                </p:spPr>
-                <p:style>
-                  <a:lnRef idx="0">
-                    <a:schemeClr val="accent1"/>
-                  </a:lnRef>
-                  <a:fillRef idx="0">
-                    <a:schemeClr val="accent1"/>
-                  </a:fillRef>
-                  <a:effectRef idx="0">
-                    <a:schemeClr val="accent1"/>
-                  </a:effectRef>
-                  <a:fontRef idx="minor">
-                    <a:schemeClr val="dk1"/>
-                  </a:fontRef>
-                </p:style>
-                <p:txBody>
-                  <a:bodyPr rot="0" spcFirstLastPara="0" vert="horz" wrap="square" lIns="91440" tIns="45720" rIns="91440" bIns="45720" numCol="1" spcCol="0" rtlCol="0" fromWordArt="0" anchor="t" anchorCtr="0" forceAA="0" compatLnSpc="1">
-                    <a:prstTxWarp prst="textNoShape">
-                      <a:avLst/>
-                    </a:prstTxWarp>
-                    <a:noAutofit/>
-                  </a:bodyPr>
-                  <a:lstStyle/>
-                  <a:p>
-                    <a:pPr>
-                      <a:lnSpc>
-                        <a:spcPct val="115000"/>
-                      </a:lnSpc>
-                    </a:pPr>
-                    <a14:m>
-                      <m:oMath xmlns:m="http://schemas.openxmlformats.org/officeDocument/2006/math">
-                        <m:r>
-                          <a:rPr lang="en-US" sz="800" i="1" dirty="0" smtClean="0">
-                            <a:solidFill>
-                              <a:schemeClr val="tx1">
-                                <a:lumMod val="85000"/>
-                                <a:lumOff val="15000"/>
-                              </a:schemeClr>
-                            </a:solidFill>
-                            <a:effectLst/>
-                            <a:latin typeface="Cambria Math" panose="02040503050406030204" pitchFamily="18" charset="0"/>
-                            <a:ea typeface="Calibri"/>
-                            <a:cs typeface="Times New Roman"/>
-                          </a:rPr>
-                          <m:t>𝐸</m:t>
-                        </m:r>
-                      </m:oMath>
-                    </a14:m>
-                    <a:r>
-                      <a:rPr lang="en-US" sz="800" dirty="0">
-                        <a:solidFill>
-                          <a:schemeClr val="tx1">
-                            <a:lumMod val="85000"/>
-                            <a:lumOff val="15000"/>
-                          </a:schemeClr>
-                        </a:solidFill>
-                        <a:effectLst/>
-                        <a:ea typeface="Calibri"/>
-                        <a:cs typeface="Times New Roman"/>
-                      </a:rPr>
-                      <a:t> : </a:t>
-                    </a:r>
-                    <a:r>
-                      <a:rPr lang="en-US" sz="800" i="1" dirty="0">
-                        <a:solidFill>
-                          <a:schemeClr val="tx1">
-                            <a:lumMod val="85000"/>
-                            <a:lumOff val="15000"/>
-                          </a:schemeClr>
-                        </a:solidFill>
-                      </a:rPr>
-                      <a:t>Center of entrance pupil</a:t>
-                    </a:r>
-                  </a:p>
-                  <a:p>
-                    <a:pPr>
-                      <a:lnSpc>
-                        <a:spcPct val="115000"/>
-                      </a:lnSpc>
-                    </a:pPr>
-                    <a:endParaRPr lang="en-US" sz="800" i="1" dirty="0">
-                      <a:solidFill>
-                        <a:schemeClr val="tx1">
-                          <a:lumMod val="85000"/>
-                          <a:lumOff val="15000"/>
-                        </a:schemeClr>
-                      </a:solidFill>
-                    </a:endParaRPr>
-                  </a:p>
-                  <a:p>
-                    <a:pPr marL="0" marR="0">
-                      <a:lnSpc>
-                        <a:spcPct val="115000"/>
-                      </a:lnSpc>
-                      <a:spcBef>
-                        <a:spcPts val="0"/>
-                      </a:spcBef>
-                      <a:spcAft>
-                        <a:spcPts val="0"/>
-                      </a:spcAft>
-                    </a:pPr>
-                    <a:endParaRPr lang="en-US" sz="800" dirty="0">
-                      <a:solidFill>
-                        <a:schemeClr val="tx1">
-                          <a:lumMod val="85000"/>
-                          <a:lumOff val="15000"/>
-                        </a:schemeClr>
-                      </a:solidFill>
-                      <a:effectLst/>
-                      <a:ea typeface="Calibri"/>
-                      <a:cs typeface="Times New Roman"/>
-                    </a:endParaRPr>
-                  </a:p>
-                </p:txBody>
-              </p:sp>
-            </mc:Choice>
-            <mc:Fallback>
-              <p:sp>
-                <p:nvSpPr>
-                  <p:cNvPr id="614" name="Text Box 15"/>
-                  <p:cNvSpPr txBox="1">
-                    <a:spLocks noRot="1" noChangeAspect="1" noMove="1" noResize="1" noEditPoints="1" noAdjustHandles="1" noChangeArrowheads="1" noChangeShapeType="1" noTextEdit="1"/>
-                  </p:cNvSpPr>
-                  <p:nvPr/>
-                </p:nvSpPr>
-                <p:spPr>
-                  <a:xfrm flipH="1">
-                    <a:off x="3842772" y="3452673"/>
-                    <a:ext cx="1550934" cy="326409"/>
-                  </a:xfrm>
-                  <a:prstGeom prst="rect">
-                    <a:avLst/>
-                  </a:prstGeom>
-                  <a:blipFill>
-                    <a:blip r:embed="rId3"/>
-                    <a:stretch>
-                      <a:fillRect/>
-                    </a:stretch>
-                  </a:blipFill>
-                  <a:ln w="6350">
-                    <a:noFill/>
-                  </a:ln>
-                  <a:effectLst/>
-                </p:spPr>
-                <p:txBody>
-                  <a:bodyPr/>
-                  <a:lstStyle/>
-                  <a:p>
-                    <a:r>
-                      <a:rPr lang="en-US">
-                        <a:noFill/>
-                      </a:rPr>
-                      <a:t> </a:t>
-                    </a:r>
-                  </a:p>
-                </p:txBody>
-              </p:sp>
-            </mc:Fallback>
-          </mc:AlternateContent>
-          <mc:AlternateContent xmlns:mc="http://schemas.openxmlformats.org/markup-compatibility/2006">
-            <mc:Choice xmlns:a14="http://schemas.microsoft.com/office/drawing/2010/main" Requires="a14">
-              <p:sp>
-                <p:nvSpPr>
-                  <p:cNvPr id="615" name="Text Box 15"/>
-                  <p:cNvSpPr txBox="1">
-                    <a:spLocks noChangeAspect="1"/>
-                  </p:cNvSpPr>
-                  <p:nvPr/>
-                </p:nvSpPr>
-                <p:spPr>
-                  <a:xfrm flipH="1">
-                    <a:off x="3842772" y="3621736"/>
-                    <a:ext cx="1391211" cy="326409"/>
-                  </a:xfrm>
-                  <a:prstGeom prst="rect">
-                    <a:avLst/>
-                  </a:prstGeom>
-                  <a:noFill/>
-                  <a:ln w="6350">
-                    <a:noFill/>
-                  </a:ln>
-                  <a:effectLst/>
-                </p:spPr>
-                <p:style>
-                  <a:lnRef idx="0">
-                    <a:schemeClr val="accent1"/>
-                  </a:lnRef>
-                  <a:fillRef idx="0">
-                    <a:schemeClr val="accent1"/>
-                  </a:fillRef>
-                  <a:effectRef idx="0">
-                    <a:schemeClr val="accent1"/>
-                  </a:effectRef>
-                  <a:fontRef idx="minor">
-                    <a:schemeClr val="dk1"/>
-                  </a:fontRef>
-                </p:style>
-                <p:txBody>
-                  <a:bodyPr rot="0" spcFirstLastPara="0" vert="horz" wrap="square" lIns="91440" tIns="45720" rIns="91440" bIns="45720" numCol="1" spcCol="0" rtlCol="0" fromWordArt="0" anchor="t" anchorCtr="0" forceAA="0" compatLnSpc="1">
-                    <a:prstTxWarp prst="textNoShape">
-                      <a:avLst/>
-                    </a:prstTxWarp>
-                    <a:noAutofit/>
-                  </a:bodyPr>
-                  <a:lstStyle/>
-                  <a:p>
-                    <a:pPr marL="0" marR="0">
-                      <a:lnSpc>
-                        <a:spcPct val="115000"/>
-                      </a:lnSpc>
-                      <a:spcBef>
-                        <a:spcPts val="0"/>
-                      </a:spcBef>
-                      <a:spcAft>
-                        <a:spcPts val="0"/>
-                      </a:spcAft>
-                    </a:pPr>
-                    <a14:m>
-                      <m:oMath xmlns:m="http://schemas.openxmlformats.org/officeDocument/2006/math">
-                        <m:acc>
-                          <m:accPr>
-                            <m:chr m:val="́"/>
-                            <m:ctrlPr>
-                              <a:rPr lang="en-US" sz="800" b="0" i="1" dirty="0" smtClean="0">
-                                <a:solidFill>
-                                  <a:schemeClr val="tx1">
-                                    <a:lumMod val="85000"/>
-                                    <a:lumOff val="15000"/>
-                                  </a:schemeClr>
-                                </a:solidFill>
-                                <a:effectLst/>
-                                <a:latin typeface="Cambria Math" panose="02040503050406030204" pitchFamily="18" charset="0"/>
-                                <a:ea typeface="Calibri"/>
-                                <a:cs typeface="Times New Roman"/>
-                              </a:rPr>
-                            </m:ctrlPr>
-                          </m:accPr>
-                          <m:e>
-                            <m:r>
-                              <a:rPr lang="en-US" sz="800" i="1" dirty="0" smtClean="0">
-                                <a:solidFill>
-                                  <a:schemeClr val="tx1">
-                                    <a:lumMod val="85000"/>
-                                    <a:lumOff val="15000"/>
-                                  </a:schemeClr>
-                                </a:solidFill>
-                                <a:effectLst/>
-                                <a:latin typeface="Cambria Math" panose="02040503050406030204" pitchFamily="18" charset="0"/>
-                                <a:ea typeface="Calibri"/>
-                                <a:cs typeface="Times New Roman"/>
-                              </a:rPr>
-                              <m:t>𝐸</m:t>
-                            </m:r>
-                          </m:e>
-                        </m:acc>
-                      </m:oMath>
-                    </a14:m>
-                    <a:r>
-                      <a:rPr lang="en-US" sz="800" dirty="0">
-                        <a:solidFill>
-                          <a:schemeClr val="tx1">
-                            <a:lumMod val="85000"/>
-                            <a:lumOff val="15000"/>
-                          </a:schemeClr>
-                        </a:solidFill>
-                        <a:effectLst/>
-                        <a:ea typeface="Calibri"/>
-                        <a:cs typeface="Times New Roman"/>
-                      </a:rPr>
-                      <a:t>: </a:t>
-                    </a:r>
-                    <a:r>
-                      <a:rPr lang="en-US" sz="800" i="1" dirty="0">
-                        <a:solidFill>
-                          <a:schemeClr val="tx1">
-                            <a:lumMod val="85000"/>
-                            <a:lumOff val="15000"/>
-                          </a:schemeClr>
-                        </a:solidFill>
-                        <a:effectLst/>
-                        <a:ea typeface="Calibri"/>
-                        <a:cs typeface="Times New Roman"/>
-                      </a:rPr>
-                      <a:t>Center of exit pupil</a:t>
-                    </a:r>
-                  </a:p>
-                </p:txBody>
-              </p:sp>
-            </mc:Choice>
-            <mc:Fallback>
-              <p:sp>
-                <p:nvSpPr>
-                  <p:cNvPr id="615" name="Text Box 15"/>
-                  <p:cNvSpPr txBox="1">
-                    <a:spLocks noRot="1" noChangeAspect="1" noMove="1" noResize="1" noEditPoints="1" noAdjustHandles="1" noChangeArrowheads="1" noChangeShapeType="1" noTextEdit="1"/>
-                  </p:cNvSpPr>
-                  <p:nvPr/>
-                </p:nvSpPr>
-                <p:spPr>
-                  <a:xfrm flipH="1">
-                    <a:off x="3842772" y="3621736"/>
-                    <a:ext cx="1391211" cy="326409"/>
-                  </a:xfrm>
-                  <a:prstGeom prst="rect">
-                    <a:avLst/>
-                  </a:prstGeom>
-                  <a:blipFill>
-                    <a:blip r:embed="rId4"/>
-                    <a:stretch>
-                      <a:fillRect/>
-                    </a:stretch>
-                  </a:blipFill>
-                  <a:ln w="6350">
-                    <a:noFill/>
-                  </a:ln>
-                  <a:effectLst/>
-                </p:spPr>
-                <p:txBody>
-                  <a:bodyPr/>
-                  <a:lstStyle/>
-                  <a:p>
-                    <a:r>
-                      <a:rPr lang="en-US">
-                        <a:noFill/>
-                      </a:rPr>
-                      <a:t> </a:t>
-                    </a:r>
-                  </a:p>
-                </p:txBody>
-              </p:sp>
-            </mc:Fallback>
-          </mc:AlternateContent>
-          <mc:AlternateContent xmlns:mc="http://schemas.openxmlformats.org/markup-compatibility/2006">
-            <mc:Choice xmlns:a14="http://schemas.microsoft.com/office/drawing/2010/main" Requires="a14">
-              <p:sp>
-                <p:nvSpPr>
-                  <p:cNvPr id="616" name="Text Box 15"/>
-                  <p:cNvSpPr txBox="1">
-                    <a:spLocks noChangeAspect="1"/>
-                  </p:cNvSpPr>
-                  <p:nvPr/>
-                </p:nvSpPr>
-                <p:spPr>
-                  <a:xfrm flipH="1">
-                    <a:off x="3842772" y="4282498"/>
-                    <a:ext cx="1391211" cy="326409"/>
-                  </a:xfrm>
-                  <a:prstGeom prst="rect">
-                    <a:avLst/>
-                  </a:prstGeom>
-                  <a:noFill/>
-                  <a:ln w="6350">
-                    <a:noFill/>
-                  </a:ln>
-                  <a:effectLst/>
-                </p:spPr>
-                <p:style>
-                  <a:lnRef idx="0">
-                    <a:schemeClr val="accent1"/>
-                  </a:lnRef>
-                  <a:fillRef idx="0">
-                    <a:schemeClr val="accent1"/>
-                  </a:fillRef>
-                  <a:effectRef idx="0">
-                    <a:schemeClr val="accent1"/>
-                  </a:effectRef>
-                  <a:fontRef idx="minor">
-                    <a:schemeClr val="dk1"/>
-                  </a:fontRef>
-                </p:style>
-                <p:txBody>
-                  <a:bodyPr rot="0" spcFirstLastPara="0" vert="horz" wrap="square" lIns="91440" tIns="45720" rIns="91440" bIns="45720" numCol="1" spcCol="0" rtlCol="0" fromWordArt="0" anchor="t" anchorCtr="0" forceAA="0" compatLnSpc="1">
-                    <a:prstTxWarp prst="textNoShape">
-                      <a:avLst/>
-                    </a:prstTxWarp>
-                    <a:noAutofit/>
-                  </a:bodyPr>
-                  <a:lstStyle/>
-                  <a:p>
-                    <a:pPr marL="0" marR="0">
-                      <a:lnSpc>
-                        <a:spcPct val="115000"/>
-                      </a:lnSpc>
-                      <a:spcBef>
-                        <a:spcPts val="0"/>
-                      </a:spcBef>
-                      <a:spcAft>
-                        <a:spcPts val="0"/>
-                      </a:spcAft>
-                    </a:pPr>
-                    <a14:m>
-                      <m:oMath xmlns:m="http://schemas.openxmlformats.org/officeDocument/2006/math">
-                        <m:sSub>
-                          <m:sSubPr>
-                            <m:ctrlPr>
-                              <a:rPr lang="en-US" sz="800" b="0" i="1" dirty="0" smtClean="0">
-                                <a:solidFill>
-                                  <a:schemeClr val="tx1">
-                                    <a:lumMod val="85000"/>
-                                    <a:lumOff val="15000"/>
-                                  </a:schemeClr>
-                                </a:solidFill>
-                                <a:effectLst/>
-                                <a:latin typeface="Cambria Math" panose="02040503050406030204" pitchFamily="18" charset="0"/>
-                                <a:ea typeface="Calibri"/>
-                                <a:cs typeface="Times New Roman"/>
-                              </a:rPr>
-                            </m:ctrlPr>
-                          </m:sSubPr>
-                          <m:e>
-                            <m:acc>
-                              <m:accPr>
-                                <m:chr m:val="̂"/>
-                                <m:ctrlPr>
-                                  <a:rPr lang="en-US" sz="800" b="0" i="1" dirty="0" smtClean="0">
-                                    <a:solidFill>
-                                      <a:schemeClr val="tx1">
-                                        <a:lumMod val="85000"/>
-                                        <a:lumOff val="15000"/>
-                                      </a:schemeClr>
-                                    </a:solidFill>
-                                    <a:effectLst/>
-                                    <a:latin typeface="Cambria Math" panose="02040503050406030204" pitchFamily="18" charset="0"/>
-                                    <a:ea typeface="Calibri"/>
-                                    <a:cs typeface="Times New Roman"/>
-                                  </a:rPr>
-                                </m:ctrlPr>
-                              </m:accPr>
-                              <m:e>
-                                <m:r>
-                                  <a:rPr lang="en-US" sz="800" b="0" i="1" dirty="0" smtClean="0">
-                                    <a:solidFill>
-                                      <a:schemeClr val="tx1">
-                                        <a:lumMod val="85000"/>
-                                        <a:lumOff val="15000"/>
-                                      </a:schemeClr>
-                                    </a:solidFill>
-                                    <a:effectLst/>
-                                    <a:latin typeface="Cambria Math" panose="02040503050406030204" pitchFamily="18" charset="0"/>
-                                    <a:ea typeface="Calibri"/>
-                                    <a:cs typeface="Times New Roman"/>
-                                  </a:rPr>
-                                  <m:t>𝑛</m:t>
-                                </m:r>
-                              </m:e>
-                            </m:acc>
-                          </m:e>
-                          <m:sub>
-                            <m:r>
-                              <a:rPr lang="en-US" sz="800" b="0" i="1" dirty="0" smtClean="0">
-                                <a:solidFill>
-                                  <a:schemeClr val="tx1">
-                                    <a:lumMod val="85000"/>
-                                    <a:lumOff val="15000"/>
-                                  </a:schemeClr>
-                                </a:solidFill>
-                                <a:effectLst/>
-                                <a:latin typeface="Cambria Math" panose="02040503050406030204" pitchFamily="18" charset="0"/>
-                                <a:ea typeface="Calibri"/>
-                                <a:cs typeface="Times New Roman"/>
-                              </a:rPr>
-                              <m:t>𝑖</m:t>
-                            </m:r>
-                          </m:sub>
-                        </m:sSub>
-                      </m:oMath>
-                    </a14:m>
-                    <a:r>
-                      <a:rPr lang="en-US" sz="800" dirty="0">
-                        <a:solidFill>
-                          <a:schemeClr val="tx1">
-                            <a:lumMod val="85000"/>
-                            <a:lumOff val="15000"/>
-                          </a:schemeClr>
-                        </a:solidFill>
-                        <a:effectLst/>
-                        <a:ea typeface="Calibri"/>
-                        <a:cs typeface="Times New Roman"/>
-                      </a:rPr>
-                      <a:t>: </a:t>
-                    </a:r>
-                    <a:r>
-                      <a:rPr lang="en-US" sz="800" i="1" dirty="0">
-                        <a:solidFill>
-                          <a:schemeClr val="tx1">
-                            <a:lumMod val="85000"/>
-                            <a:lumOff val="15000"/>
-                          </a:schemeClr>
-                        </a:solidFill>
-                        <a:effectLst/>
-                        <a:ea typeface="Calibri"/>
-                        <a:cs typeface="Times New Roman"/>
-                      </a:rPr>
-                      <a:t>Normal to image plane</a:t>
-                    </a:r>
-                  </a:p>
-                </p:txBody>
-              </p:sp>
-            </mc:Choice>
-            <mc:Fallback>
-              <p:sp>
-                <p:nvSpPr>
-                  <p:cNvPr id="616" name="Text Box 15"/>
-                  <p:cNvSpPr txBox="1">
-                    <a:spLocks noRot="1" noChangeAspect="1" noMove="1" noResize="1" noEditPoints="1" noAdjustHandles="1" noChangeArrowheads="1" noChangeShapeType="1" noTextEdit="1"/>
-                  </p:cNvSpPr>
-                  <p:nvPr/>
-                </p:nvSpPr>
-                <p:spPr>
-                  <a:xfrm flipH="1">
-                    <a:off x="3842772" y="4282498"/>
-                    <a:ext cx="1391211" cy="326409"/>
-                  </a:xfrm>
-                  <a:prstGeom prst="rect">
-                    <a:avLst/>
-                  </a:prstGeom>
-                  <a:blipFill>
-                    <a:blip r:embed="rId5"/>
-                    <a:stretch>
-                      <a:fillRect/>
-                    </a:stretch>
-                  </a:blipFill>
-                  <a:ln w="6350">
-                    <a:noFill/>
-                  </a:ln>
-                  <a:effectLst/>
-                </p:spPr>
-                <p:txBody>
-                  <a:bodyPr/>
-                  <a:lstStyle/>
-                  <a:p>
-                    <a:r>
-                      <a:rPr lang="en-US">
-                        <a:noFill/>
-                      </a:rPr>
-                      <a:t> </a:t>
-                    </a:r>
-                  </a:p>
-                </p:txBody>
-              </p:sp>
-            </mc:Fallback>
-          </mc:AlternateContent>
-          <mc:AlternateContent xmlns:mc="http://schemas.openxmlformats.org/markup-compatibility/2006">
-            <mc:Choice xmlns:a14="http://schemas.microsoft.com/office/drawing/2010/main" Requires="a14">
-              <p:sp>
-                <p:nvSpPr>
-                  <p:cNvPr id="617" name="Text Box 15"/>
-                  <p:cNvSpPr txBox="1">
-                    <a:spLocks noChangeAspect="1"/>
-                  </p:cNvSpPr>
-                  <p:nvPr/>
-                </p:nvSpPr>
-                <p:spPr>
-                  <a:xfrm flipH="1">
-                    <a:off x="3842772" y="3795562"/>
-                    <a:ext cx="1643627" cy="551427"/>
-                  </a:xfrm>
-                  <a:prstGeom prst="rect">
-                    <a:avLst/>
-                  </a:prstGeom>
-                  <a:noFill/>
-                  <a:ln w="6350">
-                    <a:noFill/>
-                  </a:ln>
-                  <a:effectLst/>
-                </p:spPr>
-                <p:style>
-                  <a:lnRef idx="0">
-                    <a:schemeClr val="accent1"/>
-                  </a:lnRef>
-                  <a:fillRef idx="0">
-                    <a:schemeClr val="accent1"/>
-                  </a:fillRef>
-                  <a:effectRef idx="0">
-                    <a:schemeClr val="accent1"/>
-                  </a:effectRef>
-                  <a:fontRef idx="minor">
-                    <a:schemeClr val="dk1"/>
-                  </a:fontRef>
-                </p:style>
-                <p:txBody>
-                  <a:bodyPr rot="0" spcFirstLastPara="0" vert="horz" wrap="square" lIns="91440" tIns="45720" rIns="91440" bIns="45720" numCol="1" spcCol="0" rtlCol="0" fromWordArt="0" anchor="t" anchorCtr="0" forceAA="0" compatLnSpc="1">
-                    <a:prstTxWarp prst="textNoShape">
-                      <a:avLst/>
-                    </a:prstTxWarp>
-                    <a:noAutofit/>
-                  </a:bodyPr>
-                  <a:lstStyle/>
-                  <a:p>
-                    <a:pPr marL="171450" marR="0" indent="-171450">
-                      <a:lnSpc>
-                        <a:spcPct val="115000"/>
-                      </a:lnSpc>
-                      <a:spcBef>
-                        <a:spcPts val="0"/>
-                      </a:spcBef>
-                      <a:spcAft>
-                        <a:spcPts val="0"/>
-                      </a:spcAft>
-                    </a:pPr>
-                    <a14:m>
-                      <m:oMath xmlns:m="http://schemas.openxmlformats.org/officeDocument/2006/math">
-                        <m:sSub>
-                          <m:sSubPr>
-                            <m:ctrlPr>
-                              <a:rPr lang="en-US" sz="800" b="0" i="1" dirty="0" smtClean="0">
-                                <a:solidFill>
-                                  <a:schemeClr val="tx1">
-                                    <a:lumMod val="85000"/>
-                                    <a:lumOff val="15000"/>
-                                  </a:schemeClr>
-                                </a:solidFill>
-                                <a:effectLst/>
-                                <a:latin typeface="Cambria Math" panose="02040503050406030204" pitchFamily="18" charset="0"/>
-                                <a:ea typeface="Calibri"/>
-                                <a:cs typeface="Times New Roman"/>
-                              </a:rPr>
-                            </m:ctrlPr>
-                          </m:sSubPr>
-                          <m:e>
-                            <m:r>
-                              <a:rPr lang="en-US" sz="800" b="0" i="1" dirty="0" smtClean="0">
-                                <a:solidFill>
-                                  <a:schemeClr val="tx1">
-                                    <a:lumMod val="85000"/>
-                                    <a:lumOff val="15000"/>
-                                  </a:schemeClr>
-                                </a:solidFill>
-                                <a:effectLst/>
-                                <a:latin typeface="Cambria Math" panose="02040503050406030204" pitchFamily="18" charset="0"/>
-                                <a:ea typeface="Calibri"/>
-                                <a:cs typeface="Times New Roman"/>
-                              </a:rPr>
-                              <m:t>𝑅</m:t>
-                            </m:r>
-                          </m:e>
-                          <m:sub>
-                            <m:r>
-                              <a:rPr lang="en-US" sz="800" b="0" i="1" dirty="0" smtClean="0">
-                                <a:solidFill>
-                                  <a:schemeClr val="tx1">
-                                    <a:lumMod val="85000"/>
-                                    <a:lumOff val="15000"/>
-                                  </a:schemeClr>
-                                </a:solidFill>
-                                <a:effectLst/>
-                                <a:latin typeface="Cambria Math" panose="02040503050406030204" pitchFamily="18" charset="0"/>
-                                <a:ea typeface="Calibri"/>
-                                <a:cs typeface="Times New Roman"/>
-                              </a:rPr>
-                              <m:t>ℓ</m:t>
-                            </m:r>
-                          </m:sub>
-                        </m:sSub>
-                      </m:oMath>
-                    </a14:m>
-                    <a:r>
-                      <a:rPr lang="en-US" sz="800" dirty="0">
-                        <a:solidFill>
-                          <a:schemeClr val="tx1">
-                            <a:lumMod val="85000"/>
-                            <a:lumOff val="15000"/>
-                          </a:schemeClr>
-                        </a:solidFill>
-                        <a:effectLst/>
-                        <a:ea typeface="Calibri"/>
-                        <a:cs typeface="Times New Roman"/>
-                      </a:rPr>
-                      <a:t>: </a:t>
-                    </a:r>
-                    <a:r>
-                      <a:rPr lang="en-US" sz="800" i="1" dirty="0">
-                        <a:solidFill>
-                          <a:schemeClr val="tx1">
-                            <a:lumMod val="85000"/>
-                            <a:lumOff val="15000"/>
-                          </a:schemeClr>
-                        </a:solidFill>
-                        <a:effectLst/>
-                        <a:ea typeface="Calibri"/>
-                        <a:cs typeface="Times New Roman"/>
-                      </a:rPr>
-                      <a:t>Rotation of lens plane (about the pivot at the origin of </a:t>
-                    </a:r>
-                    <a14:m>
-                      <m:oMath xmlns:m="http://schemas.openxmlformats.org/officeDocument/2006/math">
-                        <m:d>
-                          <m:dPr>
-                            <m:begChr m:val="{"/>
-                            <m:endChr m:val="}"/>
-                            <m:ctrlPr>
-                              <a:rPr lang="en-US" sz="800" b="0" i="1" smtClean="0">
-                                <a:solidFill>
-                                  <a:schemeClr val="tx1">
-                                    <a:lumMod val="85000"/>
-                                    <a:lumOff val="15000"/>
-                                  </a:schemeClr>
-                                </a:solidFill>
-                                <a:effectLst/>
-                                <a:latin typeface="Cambria Math" panose="02040503050406030204" pitchFamily="18" charset="0"/>
-                                <a:cs typeface="Times New Roman"/>
-                              </a:rPr>
-                            </m:ctrlPr>
-                          </m:dPr>
-                          <m:e>
-                            <m:r>
-                              <a:rPr lang="en-US" sz="800" b="0" i="1" smtClean="0">
-                                <a:solidFill>
-                                  <a:schemeClr val="tx1">
-                                    <a:lumMod val="85000"/>
-                                    <a:lumOff val="15000"/>
-                                  </a:schemeClr>
-                                </a:solidFill>
-                                <a:effectLst/>
-                                <a:latin typeface="Cambria Math" panose="02040503050406030204" pitchFamily="18" charset="0"/>
-                                <a:cs typeface="Times New Roman"/>
-                              </a:rPr>
-                              <m:t>𝐶</m:t>
-                            </m:r>
-                          </m:e>
-                        </m:d>
-                      </m:oMath>
-                    </a14:m>
-                    <a:endParaRPr lang="en-US" sz="800" i="1" dirty="0">
-                      <a:solidFill>
-                        <a:schemeClr val="tx1">
-                          <a:lumMod val="85000"/>
-                          <a:lumOff val="15000"/>
-                        </a:schemeClr>
-                      </a:solidFill>
-                      <a:effectLst/>
-                      <a:ea typeface="Calibri"/>
-                      <a:cs typeface="Times New Roman"/>
-                    </a:endParaRPr>
-                  </a:p>
-                </p:txBody>
-              </p:sp>
-            </mc:Choice>
-            <mc:Fallback>
-              <p:sp>
-                <p:nvSpPr>
-                  <p:cNvPr id="617" name="Text Box 15"/>
-                  <p:cNvSpPr txBox="1">
-                    <a:spLocks noRot="1" noChangeAspect="1" noMove="1" noResize="1" noEditPoints="1" noAdjustHandles="1" noChangeArrowheads="1" noChangeShapeType="1" noTextEdit="1"/>
-                  </p:cNvSpPr>
-                  <p:nvPr/>
-                </p:nvSpPr>
-                <p:spPr>
-                  <a:xfrm flipH="1">
-                    <a:off x="3842772" y="3795562"/>
-                    <a:ext cx="1643627" cy="551427"/>
-                  </a:xfrm>
-                  <a:prstGeom prst="rect">
-                    <a:avLst/>
-                  </a:prstGeom>
-                  <a:blipFill>
-                    <a:blip r:embed="rId6"/>
-                    <a:stretch>
-                      <a:fillRect/>
-                    </a:stretch>
-                  </a:blipFill>
-                  <a:ln w="6350">
-                    <a:noFill/>
-                  </a:ln>
-                  <a:effectLst/>
-                </p:spPr>
-                <p:txBody>
-                  <a:bodyPr/>
-                  <a:lstStyle/>
-                  <a:p>
-                    <a:r>
-                      <a:rPr lang="en-US">
-                        <a:noFill/>
-                      </a:rPr>
-                      <a:t> </a:t>
-                    </a:r>
-                  </a:p>
-                </p:txBody>
-              </p:sp>
-            </mc:Fallback>
-          </mc:AlternateContent>
           <mc:AlternateContent xmlns:mc="http://schemas.openxmlformats.org/markup-compatibility/2006">
             <mc:Choice xmlns:a14="http://schemas.microsoft.com/office/drawing/2010/main" Requires="a14">
               <p:sp>
@@ -10704,7 +9900,7 @@
                 </p:nvSpPr>
                 <p:spPr>
                   <a:xfrm flipH="1">
-                    <a:off x="3842772" y="4108672"/>
+                    <a:off x="3604648" y="4080099"/>
                     <a:ext cx="1662676" cy="326409"/>
                   </a:xfrm>
                   <a:prstGeom prst="rect">
@@ -10756,6 +9952,7 @@
                                     <a:lumOff val="15000"/>
                                   </a:schemeClr>
                                 </a:solidFill>
+                                <a:latin typeface="Cambria Math" panose="02040503050406030204" pitchFamily="18" charset="0"/>
                               </a:rPr>
                             </m:ctrlPr>
                           </m:sSubPr>
@@ -10768,6 +9965,7 @@
                                     <a:lumOff val="15000"/>
                                   </a:schemeClr>
                                 </a:solidFill>
+                                <a:latin typeface="Cambria Math" panose="02040503050406030204" pitchFamily="18" charset="0"/>
                               </a:rPr>
                               <m:t>𝒓</m:t>
                             </m:r>
@@ -10781,6 +9979,7 @@
                                     <a:lumOff val="15000"/>
                                   </a:schemeClr>
                                 </a:solidFill>
+                                <a:latin typeface="Cambria Math" panose="02040503050406030204" pitchFamily="18" charset="0"/>
                               </a:rPr>
                               <m:t>𝓁</m:t>
                             </m:r>
@@ -10792,6 +9991,7 @@
                                     <a:lumOff val="15000"/>
                                   </a:schemeClr>
                                 </a:solidFill>
+                                <a:latin typeface="Cambria Math" panose="02040503050406030204" pitchFamily="18" charset="0"/>
                               </a:rPr>
                               <m:t>,3</m:t>
                             </m:r>
@@ -10955,14 +10155,14 @@
                 </p:nvSpPr>
                 <p:spPr>
                   <a:xfrm flipH="1">
-                    <a:off x="3842772" y="4108672"/>
+                    <a:off x="3604648" y="4080099"/>
                     <a:ext cx="1662676" cy="326409"/>
                   </a:xfrm>
                   <a:prstGeom prst="rect">
                     <a:avLst/>
                   </a:prstGeom>
                   <a:blipFill>
-                    <a:blip r:embed="rId7"/>
+                    <a:blip r:embed="rId3"/>
                     <a:stretch>
                       <a:fillRect/>
                     </a:stretch>
@@ -10999,7 +10199,7 @@
                 </p:nvSpPr>
                 <p:spPr>
                   <a:xfrm flipH="1">
-                    <a:off x="3842772" y="4451561"/>
+                    <a:off x="3604648" y="4422988"/>
                     <a:ext cx="1619812" cy="326409"/>
                   </a:xfrm>
                   <a:prstGeom prst="rect">
@@ -11352,8 +10552,812 @@
                 </p:nvSpPr>
                 <p:spPr>
                   <a:xfrm flipH="1">
-                    <a:off x="3842772" y="4451561"/>
+                    <a:off x="3604648" y="4422988"/>
                     <a:ext cx="1619812" cy="326409"/>
+                  </a:xfrm>
+                  <a:prstGeom prst="rect">
+                    <a:avLst/>
+                  </a:prstGeom>
+                  <a:blipFill>
+                    <a:blip r:embed="rId4"/>
+                    <a:stretch>
+                      <a:fillRect/>
+                    </a:stretch>
+                  </a:blipFill>
+                  <a:ln w="6350">
+                    <a:noFill/>
+                  </a:ln>
+                  <a:effectLst/>
+                </p:spPr>
+                <p:txBody>
+                  <a:bodyPr/>
+                  <a:lstStyle/>
+                  <a:p>
+                    <a:r>
+                      <a:rPr lang="en-US">
+                        <a:noFill/>
+                      </a:rPr>
+                      <a:t> </a:t>
+                    </a:r>
+                  </a:p>
+                </p:txBody>
+              </p:sp>
+            </mc:Fallback>
+          </mc:AlternateContent>
+          <mc:AlternateContent xmlns:mc="http://schemas.openxmlformats.org/markup-compatibility/2006">
+            <mc:Choice xmlns:a14="http://schemas.microsoft.com/office/drawing/2010/main" Requires="a14">
+              <p:sp>
+                <p:nvSpPr>
+                  <p:cNvPr id="614" name="Text Box 15"/>
+                  <p:cNvSpPr txBox="1">
+                    <a:spLocks noChangeAspect="1"/>
+                  </p:cNvSpPr>
+                  <p:nvPr/>
+                </p:nvSpPr>
+                <p:spPr>
+                  <a:xfrm flipH="1">
+                    <a:off x="3604648" y="3424100"/>
+                    <a:ext cx="1550934" cy="326409"/>
+                  </a:xfrm>
+                  <a:prstGeom prst="rect">
+                    <a:avLst/>
+                  </a:prstGeom>
+                  <a:noFill/>
+                  <a:ln w="6350">
+                    <a:noFill/>
+                  </a:ln>
+                  <a:effectLst/>
+                </p:spPr>
+                <p:style>
+                  <a:lnRef idx="0">
+                    <a:schemeClr val="accent1"/>
+                  </a:lnRef>
+                  <a:fillRef idx="0">
+                    <a:schemeClr val="accent1"/>
+                  </a:fillRef>
+                  <a:effectRef idx="0">
+                    <a:schemeClr val="accent1"/>
+                  </a:effectRef>
+                  <a:fontRef idx="minor">
+                    <a:schemeClr val="dk1"/>
+                  </a:fontRef>
+                </p:style>
+                <p:txBody>
+                  <a:bodyPr rot="0" spcFirstLastPara="0" vert="horz" wrap="square" lIns="91440" tIns="45720" rIns="91440" bIns="45720" numCol="1" spcCol="0" rtlCol="0" fromWordArt="0" anchor="t" anchorCtr="0" forceAA="0" compatLnSpc="1">
+                    <a:prstTxWarp prst="textNoShape">
+                      <a:avLst/>
+                    </a:prstTxWarp>
+                    <a:noAutofit/>
+                  </a:bodyPr>
+                  <a:lstStyle/>
+                  <a:p>
+                    <a:pPr>
+                      <a:lnSpc>
+                        <a:spcPct val="115000"/>
+                      </a:lnSpc>
+                    </a:pPr>
+                    <a14:m>
+                      <m:oMath xmlns:m="http://schemas.openxmlformats.org/officeDocument/2006/math">
+                        <m:r>
+                          <a:rPr lang="en-US" sz="800" i="1" dirty="0" smtClean="0">
+                            <a:solidFill>
+                              <a:schemeClr val="tx1">
+                                <a:lumMod val="85000"/>
+                                <a:lumOff val="15000"/>
+                              </a:schemeClr>
+                            </a:solidFill>
+                            <a:effectLst/>
+                            <a:latin typeface="Cambria Math" panose="02040503050406030204" pitchFamily="18" charset="0"/>
+                            <a:ea typeface="Calibri"/>
+                            <a:cs typeface="Times New Roman"/>
+                          </a:rPr>
+                          <m:t>𝐸</m:t>
+                        </m:r>
+                      </m:oMath>
+                    </a14:m>
+                    <a:r>
+                      <a:rPr lang="en-US" sz="800" dirty="0">
+                        <a:solidFill>
+                          <a:schemeClr val="tx1">
+                            <a:lumMod val="85000"/>
+                            <a:lumOff val="15000"/>
+                          </a:schemeClr>
+                        </a:solidFill>
+                        <a:effectLst/>
+                        <a:ea typeface="Calibri"/>
+                        <a:cs typeface="Times New Roman"/>
+                      </a:rPr>
+                      <a:t> : </a:t>
+                    </a:r>
+                    <a:r>
+                      <a:rPr lang="en-US" sz="800" i="1" dirty="0">
+                        <a:solidFill>
+                          <a:schemeClr val="tx1">
+                            <a:lumMod val="85000"/>
+                            <a:lumOff val="15000"/>
+                          </a:schemeClr>
+                        </a:solidFill>
+                      </a:rPr>
+                      <a:t>Center of entrance pupil</a:t>
+                    </a:r>
+                  </a:p>
+                  <a:p>
+                    <a:pPr>
+                      <a:lnSpc>
+                        <a:spcPct val="115000"/>
+                      </a:lnSpc>
+                    </a:pPr>
+                    <a:endParaRPr lang="en-US" sz="800" i="1" dirty="0">
+                      <a:solidFill>
+                        <a:schemeClr val="tx1">
+                          <a:lumMod val="85000"/>
+                          <a:lumOff val="15000"/>
+                        </a:schemeClr>
+                      </a:solidFill>
+                    </a:endParaRPr>
+                  </a:p>
+                  <a:p>
+                    <a:pPr marL="0" marR="0">
+                      <a:lnSpc>
+                        <a:spcPct val="115000"/>
+                      </a:lnSpc>
+                      <a:spcBef>
+                        <a:spcPts val="0"/>
+                      </a:spcBef>
+                      <a:spcAft>
+                        <a:spcPts val="0"/>
+                      </a:spcAft>
+                    </a:pPr>
+                    <a:endParaRPr lang="en-US" sz="800" dirty="0">
+                      <a:solidFill>
+                        <a:schemeClr val="tx1">
+                          <a:lumMod val="85000"/>
+                          <a:lumOff val="15000"/>
+                        </a:schemeClr>
+                      </a:solidFill>
+                      <a:effectLst/>
+                      <a:ea typeface="Calibri"/>
+                      <a:cs typeface="Times New Roman"/>
+                    </a:endParaRPr>
+                  </a:p>
+                </p:txBody>
+              </p:sp>
+            </mc:Choice>
+            <mc:Fallback>
+              <p:sp>
+                <p:nvSpPr>
+                  <p:cNvPr id="614" name="Text Box 15"/>
+                  <p:cNvSpPr txBox="1">
+                    <a:spLocks noRot="1" noChangeAspect="1" noMove="1" noResize="1" noEditPoints="1" noAdjustHandles="1" noChangeArrowheads="1" noChangeShapeType="1" noTextEdit="1"/>
+                  </p:cNvSpPr>
+                  <p:nvPr/>
+                </p:nvSpPr>
+                <p:spPr>
+                  <a:xfrm flipH="1">
+                    <a:off x="3604648" y="3424100"/>
+                    <a:ext cx="1550934" cy="326409"/>
+                  </a:xfrm>
+                  <a:prstGeom prst="rect">
+                    <a:avLst/>
+                  </a:prstGeom>
+                  <a:blipFill>
+                    <a:blip r:embed="rId5"/>
+                    <a:stretch>
+                      <a:fillRect/>
+                    </a:stretch>
+                  </a:blipFill>
+                  <a:ln w="6350">
+                    <a:noFill/>
+                  </a:ln>
+                  <a:effectLst/>
+                </p:spPr>
+                <p:txBody>
+                  <a:bodyPr/>
+                  <a:lstStyle/>
+                  <a:p>
+                    <a:r>
+                      <a:rPr lang="en-US">
+                        <a:noFill/>
+                      </a:rPr>
+                      <a:t> </a:t>
+                    </a:r>
+                  </a:p>
+                </p:txBody>
+              </p:sp>
+            </mc:Fallback>
+          </mc:AlternateContent>
+          <mc:AlternateContent xmlns:mc="http://schemas.openxmlformats.org/markup-compatibility/2006">
+            <mc:Choice xmlns:a14="http://schemas.microsoft.com/office/drawing/2010/main" Requires="a14">
+              <p:sp>
+                <p:nvSpPr>
+                  <p:cNvPr id="615" name="Text Box 15"/>
+                  <p:cNvSpPr txBox="1">
+                    <a:spLocks noChangeAspect="1"/>
+                  </p:cNvSpPr>
+                  <p:nvPr/>
+                </p:nvSpPr>
+                <p:spPr>
+                  <a:xfrm flipH="1">
+                    <a:off x="3604648" y="3593163"/>
+                    <a:ext cx="1391211" cy="326409"/>
+                  </a:xfrm>
+                  <a:prstGeom prst="rect">
+                    <a:avLst/>
+                  </a:prstGeom>
+                  <a:noFill/>
+                  <a:ln w="6350">
+                    <a:noFill/>
+                  </a:ln>
+                  <a:effectLst/>
+                </p:spPr>
+                <p:style>
+                  <a:lnRef idx="0">
+                    <a:schemeClr val="accent1"/>
+                  </a:lnRef>
+                  <a:fillRef idx="0">
+                    <a:schemeClr val="accent1"/>
+                  </a:fillRef>
+                  <a:effectRef idx="0">
+                    <a:schemeClr val="accent1"/>
+                  </a:effectRef>
+                  <a:fontRef idx="minor">
+                    <a:schemeClr val="dk1"/>
+                  </a:fontRef>
+                </p:style>
+                <p:txBody>
+                  <a:bodyPr rot="0" spcFirstLastPara="0" vert="horz" wrap="square" lIns="91440" tIns="45720" rIns="91440" bIns="45720" numCol="1" spcCol="0" rtlCol="0" fromWordArt="0" anchor="t" anchorCtr="0" forceAA="0" compatLnSpc="1">
+                    <a:prstTxWarp prst="textNoShape">
+                      <a:avLst/>
+                    </a:prstTxWarp>
+                    <a:noAutofit/>
+                  </a:bodyPr>
+                  <a:lstStyle/>
+                  <a:p>
+                    <a:pPr marL="0" marR="0">
+                      <a:lnSpc>
+                        <a:spcPct val="115000"/>
+                      </a:lnSpc>
+                      <a:spcBef>
+                        <a:spcPts val="0"/>
+                      </a:spcBef>
+                      <a:spcAft>
+                        <a:spcPts val="0"/>
+                      </a:spcAft>
+                    </a:pPr>
+                    <a14:m>
+                      <m:oMath xmlns:m="http://schemas.openxmlformats.org/officeDocument/2006/math">
+                        <m:acc>
+                          <m:accPr>
+                            <m:chr m:val="́"/>
+                            <m:ctrlPr>
+                              <a:rPr lang="en-US" sz="800" b="0" i="1" dirty="0" smtClean="0">
+                                <a:solidFill>
+                                  <a:schemeClr val="tx1">
+                                    <a:lumMod val="85000"/>
+                                    <a:lumOff val="15000"/>
+                                  </a:schemeClr>
+                                </a:solidFill>
+                                <a:effectLst/>
+                                <a:latin typeface="Cambria Math" panose="02040503050406030204" pitchFamily="18" charset="0"/>
+                                <a:ea typeface="Calibri"/>
+                                <a:cs typeface="Times New Roman"/>
+                              </a:rPr>
+                            </m:ctrlPr>
+                          </m:accPr>
+                          <m:e>
+                            <m:r>
+                              <a:rPr lang="en-US" sz="800" i="1" dirty="0" smtClean="0">
+                                <a:solidFill>
+                                  <a:schemeClr val="tx1">
+                                    <a:lumMod val="85000"/>
+                                    <a:lumOff val="15000"/>
+                                  </a:schemeClr>
+                                </a:solidFill>
+                                <a:effectLst/>
+                                <a:latin typeface="Cambria Math" panose="02040503050406030204" pitchFamily="18" charset="0"/>
+                                <a:ea typeface="Calibri"/>
+                                <a:cs typeface="Times New Roman"/>
+                              </a:rPr>
+                              <m:t>𝐸</m:t>
+                            </m:r>
+                          </m:e>
+                        </m:acc>
+                      </m:oMath>
+                    </a14:m>
+                    <a:r>
+                      <a:rPr lang="en-US" sz="800" dirty="0">
+                        <a:solidFill>
+                          <a:schemeClr val="tx1">
+                            <a:lumMod val="85000"/>
+                            <a:lumOff val="15000"/>
+                          </a:schemeClr>
+                        </a:solidFill>
+                        <a:effectLst/>
+                        <a:ea typeface="Calibri"/>
+                        <a:cs typeface="Times New Roman"/>
+                      </a:rPr>
+                      <a:t>: </a:t>
+                    </a:r>
+                    <a:r>
+                      <a:rPr lang="en-US" sz="800" i="1" dirty="0">
+                        <a:solidFill>
+                          <a:schemeClr val="tx1">
+                            <a:lumMod val="85000"/>
+                            <a:lumOff val="15000"/>
+                          </a:schemeClr>
+                        </a:solidFill>
+                        <a:effectLst/>
+                        <a:ea typeface="Calibri"/>
+                        <a:cs typeface="Times New Roman"/>
+                      </a:rPr>
+                      <a:t>Center of exit pupil</a:t>
+                    </a:r>
+                  </a:p>
+                </p:txBody>
+              </p:sp>
+            </mc:Choice>
+            <mc:Fallback>
+              <p:sp>
+                <p:nvSpPr>
+                  <p:cNvPr id="615" name="Text Box 15"/>
+                  <p:cNvSpPr txBox="1">
+                    <a:spLocks noRot="1" noChangeAspect="1" noMove="1" noResize="1" noEditPoints="1" noAdjustHandles="1" noChangeArrowheads="1" noChangeShapeType="1" noTextEdit="1"/>
+                  </p:cNvSpPr>
+                  <p:nvPr/>
+                </p:nvSpPr>
+                <p:spPr>
+                  <a:xfrm flipH="1">
+                    <a:off x="3604648" y="3593163"/>
+                    <a:ext cx="1391211" cy="326409"/>
+                  </a:xfrm>
+                  <a:prstGeom prst="rect">
+                    <a:avLst/>
+                  </a:prstGeom>
+                  <a:blipFill>
+                    <a:blip r:embed="rId6"/>
+                    <a:stretch>
+                      <a:fillRect/>
+                    </a:stretch>
+                  </a:blipFill>
+                  <a:ln w="6350">
+                    <a:noFill/>
+                  </a:ln>
+                  <a:effectLst/>
+                </p:spPr>
+                <p:txBody>
+                  <a:bodyPr/>
+                  <a:lstStyle/>
+                  <a:p>
+                    <a:r>
+                      <a:rPr lang="en-US">
+                        <a:noFill/>
+                      </a:rPr>
+                      <a:t> </a:t>
+                    </a:r>
+                  </a:p>
+                </p:txBody>
+              </p:sp>
+            </mc:Fallback>
+          </mc:AlternateContent>
+          <mc:AlternateContent xmlns:mc="http://schemas.openxmlformats.org/markup-compatibility/2006">
+            <mc:Choice xmlns:a14="http://schemas.microsoft.com/office/drawing/2010/main" Requires="a14">
+              <p:sp>
+                <p:nvSpPr>
+                  <p:cNvPr id="616" name="Text Box 15"/>
+                  <p:cNvSpPr txBox="1">
+                    <a:spLocks noChangeAspect="1"/>
+                  </p:cNvSpPr>
+                  <p:nvPr/>
+                </p:nvSpPr>
+                <p:spPr>
+                  <a:xfrm flipH="1">
+                    <a:off x="3604648" y="4253925"/>
+                    <a:ext cx="1391211" cy="326409"/>
+                  </a:xfrm>
+                  <a:prstGeom prst="rect">
+                    <a:avLst/>
+                  </a:prstGeom>
+                  <a:noFill/>
+                  <a:ln w="6350">
+                    <a:noFill/>
+                  </a:ln>
+                  <a:effectLst/>
+                </p:spPr>
+                <p:style>
+                  <a:lnRef idx="0">
+                    <a:schemeClr val="accent1"/>
+                  </a:lnRef>
+                  <a:fillRef idx="0">
+                    <a:schemeClr val="accent1"/>
+                  </a:fillRef>
+                  <a:effectRef idx="0">
+                    <a:schemeClr val="accent1"/>
+                  </a:effectRef>
+                  <a:fontRef idx="minor">
+                    <a:schemeClr val="dk1"/>
+                  </a:fontRef>
+                </p:style>
+                <p:txBody>
+                  <a:bodyPr rot="0" spcFirstLastPara="0" vert="horz" wrap="square" lIns="91440" tIns="45720" rIns="91440" bIns="45720" numCol="1" spcCol="0" rtlCol="0" fromWordArt="0" anchor="t" anchorCtr="0" forceAA="0" compatLnSpc="1">
+                    <a:prstTxWarp prst="textNoShape">
+                      <a:avLst/>
+                    </a:prstTxWarp>
+                    <a:noAutofit/>
+                  </a:bodyPr>
+                  <a:lstStyle/>
+                  <a:p>
+                    <a:pPr marL="0" marR="0">
+                      <a:lnSpc>
+                        <a:spcPct val="115000"/>
+                      </a:lnSpc>
+                      <a:spcBef>
+                        <a:spcPts val="0"/>
+                      </a:spcBef>
+                      <a:spcAft>
+                        <a:spcPts val="0"/>
+                      </a:spcAft>
+                    </a:pPr>
+                    <a14:m>
+                      <m:oMath xmlns:m="http://schemas.openxmlformats.org/officeDocument/2006/math">
+                        <m:sSub>
+                          <m:sSubPr>
+                            <m:ctrlPr>
+                              <a:rPr lang="en-US" sz="800" b="0" i="1" dirty="0" smtClean="0">
+                                <a:solidFill>
+                                  <a:schemeClr val="tx1">
+                                    <a:lumMod val="85000"/>
+                                    <a:lumOff val="15000"/>
+                                  </a:schemeClr>
+                                </a:solidFill>
+                                <a:effectLst/>
+                                <a:latin typeface="Cambria Math" panose="02040503050406030204" pitchFamily="18" charset="0"/>
+                                <a:ea typeface="Calibri"/>
+                                <a:cs typeface="Times New Roman"/>
+                              </a:rPr>
+                            </m:ctrlPr>
+                          </m:sSubPr>
+                          <m:e>
+                            <m:acc>
+                              <m:accPr>
+                                <m:chr m:val="̂"/>
+                                <m:ctrlPr>
+                                  <a:rPr lang="en-US" sz="800" b="0" i="1" dirty="0" smtClean="0">
+                                    <a:solidFill>
+                                      <a:schemeClr val="tx1">
+                                        <a:lumMod val="85000"/>
+                                        <a:lumOff val="15000"/>
+                                      </a:schemeClr>
+                                    </a:solidFill>
+                                    <a:effectLst/>
+                                    <a:latin typeface="Cambria Math" panose="02040503050406030204" pitchFamily="18" charset="0"/>
+                                    <a:ea typeface="Calibri"/>
+                                    <a:cs typeface="Times New Roman"/>
+                                  </a:rPr>
+                                </m:ctrlPr>
+                              </m:accPr>
+                              <m:e>
+                                <m:r>
+                                  <a:rPr lang="en-US" sz="800" b="0" i="1" dirty="0" smtClean="0">
+                                    <a:solidFill>
+                                      <a:schemeClr val="tx1">
+                                        <a:lumMod val="85000"/>
+                                        <a:lumOff val="15000"/>
+                                      </a:schemeClr>
+                                    </a:solidFill>
+                                    <a:effectLst/>
+                                    <a:latin typeface="Cambria Math" panose="02040503050406030204" pitchFamily="18" charset="0"/>
+                                    <a:ea typeface="Calibri"/>
+                                    <a:cs typeface="Times New Roman"/>
+                                  </a:rPr>
+                                  <m:t>𝑛</m:t>
+                                </m:r>
+                              </m:e>
+                            </m:acc>
+                          </m:e>
+                          <m:sub>
+                            <m:r>
+                              <a:rPr lang="en-US" sz="800" b="0" i="1" dirty="0" smtClean="0">
+                                <a:solidFill>
+                                  <a:schemeClr val="tx1">
+                                    <a:lumMod val="85000"/>
+                                    <a:lumOff val="15000"/>
+                                  </a:schemeClr>
+                                </a:solidFill>
+                                <a:effectLst/>
+                                <a:latin typeface="Cambria Math" panose="02040503050406030204" pitchFamily="18" charset="0"/>
+                                <a:ea typeface="Calibri"/>
+                                <a:cs typeface="Times New Roman"/>
+                              </a:rPr>
+                              <m:t>𝑖</m:t>
+                            </m:r>
+                          </m:sub>
+                        </m:sSub>
+                      </m:oMath>
+                    </a14:m>
+                    <a:r>
+                      <a:rPr lang="en-US" sz="800" dirty="0">
+                        <a:solidFill>
+                          <a:schemeClr val="tx1">
+                            <a:lumMod val="85000"/>
+                            <a:lumOff val="15000"/>
+                          </a:schemeClr>
+                        </a:solidFill>
+                        <a:effectLst/>
+                        <a:ea typeface="Calibri"/>
+                        <a:cs typeface="Times New Roman"/>
+                      </a:rPr>
+                      <a:t>: </a:t>
+                    </a:r>
+                    <a:r>
+                      <a:rPr lang="en-US" sz="800" i="1" dirty="0">
+                        <a:solidFill>
+                          <a:schemeClr val="tx1">
+                            <a:lumMod val="85000"/>
+                            <a:lumOff val="15000"/>
+                          </a:schemeClr>
+                        </a:solidFill>
+                        <a:effectLst/>
+                        <a:ea typeface="Calibri"/>
+                        <a:cs typeface="Times New Roman"/>
+                      </a:rPr>
+                      <a:t>Normal to sensor plane</a:t>
+                    </a:r>
+                  </a:p>
+                </p:txBody>
+              </p:sp>
+            </mc:Choice>
+            <mc:Fallback>
+              <p:sp>
+                <p:nvSpPr>
+                  <p:cNvPr id="616" name="Text Box 15"/>
+                  <p:cNvSpPr txBox="1">
+                    <a:spLocks noRot="1" noChangeAspect="1" noMove="1" noResize="1" noEditPoints="1" noAdjustHandles="1" noChangeArrowheads="1" noChangeShapeType="1" noTextEdit="1"/>
+                  </p:cNvSpPr>
+                  <p:nvPr/>
+                </p:nvSpPr>
+                <p:spPr>
+                  <a:xfrm flipH="1">
+                    <a:off x="3604648" y="4253925"/>
+                    <a:ext cx="1391211" cy="326409"/>
+                  </a:xfrm>
+                  <a:prstGeom prst="rect">
+                    <a:avLst/>
+                  </a:prstGeom>
+                  <a:blipFill>
+                    <a:blip r:embed="rId7"/>
+                    <a:stretch>
+                      <a:fillRect/>
+                    </a:stretch>
+                  </a:blipFill>
+                  <a:ln w="6350">
+                    <a:noFill/>
+                  </a:ln>
+                  <a:effectLst/>
+                </p:spPr>
+                <p:txBody>
+                  <a:bodyPr/>
+                  <a:lstStyle/>
+                  <a:p>
+                    <a:r>
+                      <a:rPr lang="en-US">
+                        <a:noFill/>
+                      </a:rPr>
+                      <a:t> </a:t>
+                    </a:r>
+                  </a:p>
+                </p:txBody>
+              </p:sp>
+            </mc:Fallback>
+          </mc:AlternateContent>
+          <mc:AlternateContent xmlns:mc="http://schemas.openxmlformats.org/markup-compatibility/2006">
+            <mc:Choice xmlns:a14="http://schemas.microsoft.com/office/drawing/2010/main" Requires="a14">
+              <p:sp>
+                <p:nvSpPr>
+                  <p:cNvPr id="617" name="Text Box 15"/>
+                  <p:cNvSpPr txBox="1">
+                    <a:spLocks noChangeAspect="1"/>
+                  </p:cNvSpPr>
+                  <p:nvPr/>
+                </p:nvSpPr>
+                <p:spPr>
+                  <a:xfrm flipH="1">
+                    <a:off x="3604648" y="3766989"/>
+                    <a:ext cx="1643627" cy="551427"/>
+                  </a:xfrm>
+                  <a:prstGeom prst="rect">
+                    <a:avLst/>
+                  </a:prstGeom>
+                  <a:noFill/>
+                  <a:ln w="6350">
+                    <a:noFill/>
+                  </a:ln>
+                  <a:effectLst/>
+                </p:spPr>
+                <p:style>
+                  <a:lnRef idx="0">
+                    <a:schemeClr val="accent1"/>
+                  </a:lnRef>
+                  <a:fillRef idx="0">
+                    <a:schemeClr val="accent1"/>
+                  </a:fillRef>
+                  <a:effectRef idx="0">
+                    <a:schemeClr val="accent1"/>
+                  </a:effectRef>
+                  <a:fontRef idx="minor">
+                    <a:schemeClr val="dk1"/>
+                  </a:fontRef>
+                </p:style>
+                <p:txBody>
+                  <a:bodyPr rot="0" spcFirstLastPara="0" vert="horz" wrap="square" lIns="91440" tIns="45720" rIns="91440" bIns="45720" numCol="1" spcCol="0" rtlCol="0" fromWordArt="0" anchor="t" anchorCtr="0" forceAA="0" compatLnSpc="1">
+                    <a:prstTxWarp prst="textNoShape">
+                      <a:avLst/>
+                    </a:prstTxWarp>
+                    <a:noAutofit/>
+                  </a:bodyPr>
+                  <a:lstStyle/>
+                  <a:p>
+                    <a:pPr marL="171450" marR="0" indent="-171450">
+                      <a:lnSpc>
+                        <a:spcPct val="115000"/>
+                      </a:lnSpc>
+                      <a:spcBef>
+                        <a:spcPts val="0"/>
+                      </a:spcBef>
+                      <a:spcAft>
+                        <a:spcPts val="0"/>
+                      </a:spcAft>
+                    </a:pPr>
+                    <a14:m>
+                      <m:oMath xmlns:m="http://schemas.openxmlformats.org/officeDocument/2006/math">
+                        <m:sSub>
+                          <m:sSubPr>
+                            <m:ctrlPr>
+                              <a:rPr lang="en-US" sz="800" b="0" i="1" dirty="0" smtClean="0">
+                                <a:solidFill>
+                                  <a:schemeClr val="tx1">
+                                    <a:lumMod val="85000"/>
+                                    <a:lumOff val="15000"/>
+                                  </a:schemeClr>
+                                </a:solidFill>
+                                <a:effectLst/>
+                                <a:latin typeface="Cambria Math" panose="02040503050406030204" pitchFamily="18" charset="0"/>
+                                <a:ea typeface="Calibri"/>
+                                <a:cs typeface="Times New Roman"/>
+                              </a:rPr>
+                            </m:ctrlPr>
+                          </m:sSubPr>
+                          <m:e>
+                            <m:r>
+                              <a:rPr lang="en-US" sz="800" b="0" i="1" dirty="0" smtClean="0">
+                                <a:solidFill>
+                                  <a:schemeClr val="tx1">
+                                    <a:lumMod val="85000"/>
+                                    <a:lumOff val="15000"/>
+                                  </a:schemeClr>
+                                </a:solidFill>
+                                <a:effectLst/>
+                                <a:latin typeface="Cambria Math" panose="02040503050406030204" pitchFamily="18" charset="0"/>
+                                <a:ea typeface="Calibri"/>
+                                <a:cs typeface="Times New Roman"/>
+                              </a:rPr>
+                              <m:t>𝑅</m:t>
+                            </m:r>
+                          </m:e>
+                          <m:sub>
+                            <m:r>
+                              <a:rPr lang="en-US" sz="800" b="0" i="1" dirty="0" smtClean="0">
+                                <a:solidFill>
+                                  <a:schemeClr val="tx1">
+                                    <a:lumMod val="85000"/>
+                                    <a:lumOff val="15000"/>
+                                  </a:schemeClr>
+                                </a:solidFill>
+                                <a:effectLst/>
+                                <a:latin typeface="Cambria Math" panose="02040503050406030204" pitchFamily="18" charset="0"/>
+                                <a:ea typeface="Calibri"/>
+                                <a:cs typeface="Times New Roman"/>
+                              </a:rPr>
+                              <m:t>ℓ</m:t>
+                            </m:r>
+                          </m:sub>
+                        </m:sSub>
+                      </m:oMath>
+                    </a14:m>
+                    <a:r>
+                      <a:rPr lang="en-US" sz="800" dirty="0">
+                        <a:solidFill>
+                          <a:schemeClr val="tx1">
+                            <a:lumMod val="85000"/>
+                            <a:lumOff val="15000"/>
+                          </a:schemeClr>
+                        </a:solidFill>
+                        <a:effectLst/>
+                        <a:ea typeface="Calibri"/>
+                        <a:cs typeface="Times New Roman"/>
+                      </a:rPr>
+                      <a:t>: </a:t>
+                    </a:r>
+                    <a:r>
+                      <a:rPr lang="en-US" sz="800" i="1" dirty="0">
+                        <a:solidFill>
+                          <a:schemeClr val="tx1">
+                            <a:lumMod val="85000"/>
+                            <a:lumOff val="15000"/>
+                          </a:schemeClr>
+                        </a:solidFill>
+                        <a:effectLst/>
+                        <a:ea typeface="Calibri"/>
+                        <a:cs typeface="Times New Roman"/>
+                      </a:rPr>
+                      <a:t>Rotation of lens plane (about the pivot at the origin of </a:t>
+                    </a:r>
+                    <a14:m>
+                      <m:oMath xmlns:m="http://schemas.openxmlformats.org/officeDocument/2006/math">
+                        <m:d>
+                          <m:dPr>
+                            <m:begChr m:val="{"/>
+                            <m:endChr m:val="}"/>
+                            <m:ctrlPr>
+                              <a:rPr lang="en-US" sz="800" b="0" i="1" smtClean="0">
+                                <a:solidFill>
+                                  <a:schemeClr val="tx1">
+                                    <a:lumMod val="85000"/>
+                                    <a:lumOff val="15000"/>
+                                  </a:schemeClr>
+                                </a:solidFill>
+                                <a:effectLst/>
+                                <a:latin typeface="Cambria Math" panose="02040503050406030204" pitchFamily="18" charset="0"/>
+                                <a:cs typeface="Times New Roman"/>
+                              </a:rPr>
+                            </m:ctrlPr>
+                          </m:dPr>
+                          <m:e>
+                            <m:r>
+                              <a:rPr lang="en-US" sz="800" b="0" i="1" smtClean="0">
+                                <a:solidFill>
+                                  <a:schemeClr val="tx1">
+                                    <a:lumMod val="85000"/>
+                                    <a:lumOff val="15000"/>
+                                  </a:schemeClr>
+                                </a:solidFill>
+                                <a:effectLst/>
+                                <a:latin typeface="Cambria Math" panose="02040503050406030204" pitchFamily="18" charset="0"/>
+                                <a:cs typeface="Times New Roman"/>
+                              </a:rPr>
+                              <m:t>𝐶</m:t>
+                            </m:r>
+                          </m:e>
+                        </m:d>
+                      </m:oMath>
+                    </a14:m>
+                    <a:endParaRPr lang="en-US" sz="800" i="1" dirty="0">
+                      <a:solidFill>
+                        <a:schemeClr val="tx1">
+                          <a:lumMod val="85000"/>
+                          <a:lumOff val="15000"/>
+                        </a:schemeClr>
+                      </a:solidFill>
+                      <a:effectLst/>
+                      <a:ea typeface="Calibri"/>
+                      <a:cs typeface="Times New Roman"/>
+                    </a:endParaRPr>
+                  </a:p>
+                </p:txBody>
+              </p:sp>
+            </mc:Choice>
+            <mc:Fallback>
+              <p:sp>
+                <p:nvSpPr>
+                  <p:cNvPr id="617" name="Text Box 15"/>
+                  <p:cNvSpPr txBox="1">
+                    <a:spLocks noRot="1" noChangeAspect="1" noMove="1" noResize="1" noEditPoints="1" noAdjustHandles="1" noChangeArrowheads="1" noChangeShapeType="1" noTextEdit="1"/>
+                  </p:cNvSpPr>
+                  <p:nvPr/>
+                </p:nvSpPr>
+                <p:spPr>
+                  <a:xfrm flipH="1">
+                    <a:off x="3604648" y="3766989"/>
+                    <a:ext cx="1643627" cy="551427"/>
                   </a:xfrm>
                   <a:prstGeom prst="rect">
                     <a:avLst/>

</xml_diff>